<commit_message>
updated Final Documents.docx and Poverty.pptx
</commit_message>
<xml_diff>
--- a/Documentation/Poverty.pptx
+++ b/Documentation/Poverty.pptx
@@ -7,15 +7,18 @@
   <p:sldIdLst>
     <p:sldId id="256" r:id="rId2"/>
     <p:sldId id="257" r:id="rId3"/>
-    <p:sldId id="258" r:id="rId4"/>
-    <p:sldId id="259" r:id="rId5"/>
-    <p:sldId id="260" r:id="rId6"/>
-    <p:sldId id="261" r:id="rId7"/>
-    <p:sldId id="262" r:id="rId8"/>
-    <p:sldId id="263" r:id="rId9"/>
-    <p:sldId id="265" r:id="rId10"/>
-    <p:sldId id="264" r:id="rId11"/>
-    <p:sldId id="266" r:id="rId12"/>
+    <p:sldId id="270" r:id="rId4"/>
+    <p:sldId id="269" r:id="rId5"/>
+    <p:sldId id="268" r:id="rId6"/>
+    <p:sldId id="260" r:id="rId7"/>
+    <p:sldId id="261" r:id="rId8"/>
+    <p:sldId id="262" r:id="rId9"/>
+    <p:sldId id="271" r:id="rId10"/>
+    <p:sldId id="272" r:id="rId11"/>
+    <p:sldId id="263" r:id="rId12"/>
+    <p:sldId id="265" r:id="rId13"/>
+    <p:sldId id="264" r:id="rId14"/>
+    <p:sldId id="266" r:id="rId15"/>
   </p:sldIdLst>
   <p:sldSz cx="12192000" cy="6858000"/>
   <p:notesSz cx="6858000" cy="9144000"/>
@@ -114,6 +117,11 @@
       </a:defRPr>
     </a:lvl9pPr>
   </p:defaultTextStyle>
+  <p:extLst>
+    <p:ext uri="{EFAFB233-063F-42B5-8137-9DF3F51BA10A}">
+      <p15:sldGuideLst xmlns:p15="http://schemas.microsoft.com/office/powerpoint/2012/main"/>
+    </p:ext>
+  </p:extLst>
 </p:presentation>
 </file>
 
@@ -6503,55 +6511,1327 @@
       </p:grpSpPr>
       <p:sp>
         <p:nvSpPr>
-          <p:cNvPr id="2" name="Title 1"/>
-          <p:cNvSpPr>
-            <a:spLocks noGrp="1"/>
-          </p:cNvSpPr>
-          <p:nvPr>
-            <p:ph type="title"/>
-          </p:nvPr>
-        </p:nvSpPr>
-        <p:spPr/>
-        <p:txBody>
-          <a:bodyPr/>
+          <p:cNvPr id="14" name="TextBox 13"/>
+          <p:cNvSpPr txBox="1"/>
+          <p:nvPr/>
+        </p:nvSpPr>
+        <p:spPr>
+          <a:xfrm>
+            <a:off x="357808" y="952339"/>
+            <a:ext cx="5618922" cy="1478418"/>
+          </a:xfrm>
+          <a:prstGeom prst="rect">
+            <a:avLst/>
+          </a:prstGeom>
+          <a:noFill/>
+        </p:spPr>
+        <p:txBody>
+          <a:bodyPr wrap="square" rtlCol="0">
+            <a:spAutoFit/>
+          </a:bodyPr>
           <a:lstStyle/>
           <a:p>
-            <a:r>
-              <a:rPr lang="en-PH" dirty="0"/>
-              <a:t>Poverty incidence by year</a:t>
-            </a:r>
-          </a:p>
-        </p:txBody>
-      </p:sp>
-      <p:sp>
-        <p:nvSpPr>
-          <p:cNvPr id="3" name="Content Placeholder 2"/>
-          <p:cNvSpPr>
-            <a:spLocks noGrp="1"/>
-          </p:cNvSpPr>
-          <p:nvPr>
-            <p:ph sz="quarter" idx="13"/>
-          </p:nvPr>
-        </p:nvSpPr>
-        <p:spPr/>
-        <p:txBody>
-          <a:bodyPr/>
+            <a:pPr algn="ctr">
+              <a:lnSpc>
+                <a:spcPct val="150000"/>
+              </a:lnSpc>
+            </a:pPr>
+            <a:r>
+              <a:rPr lang="en-PH" sz="3200" dirty="0">
+                <a:latin typeface="Arial" panose="020B0604020202020204" pitchFamily="34" charset="0"/>
+                <a:cs typeface="Arial" panose="020B0604020202020204" pitchFamily="34" charset="0"/>
+              </a:rPr>
+              <a:t>Total Annual Family Income</a:t>
+            </a:r>
+          </a:p>
+          <a:p>
+            <a:pPr algn="ctr">
+              <a:lnSpc>
+                <a:spcPct val="150000"/>
+              </a:lnSpc>
+            </a:pPr>
+            <a:r>
+              <a:rPr lang="en-PH" sz="3200" dirty="0">
+                <a:latin typeface="Arial" panose="020B0604020202020204" pitchFamily="34" charset="0"/>
+                <a:cs typeface="Arial" panose="020B0604020202020204" pitchFamily="34" charset="0"/>
+              </a:rPr>
+              <a:t> No. of Family Members</a:t>
+            </a:r>
+          </a:p>
+        </p:txBody>
+      </p:sp>
+      <p:cxnSp>
+        <p:nvCxnSpPr>
+          <p:cNvPr id="16" name="Straight Connector 15"/>
+          <p:cNvCxnSpPr>
+            <a:cxnSpLocks/>
+          </p:cNvCxnSpPr>
+          <p:nvPr/>
+        </p:nvCxnSpPr>
+        <p:spPr>
+          <a:xfrm>
+            <a:off x="357808" y="1784313"/>
+            <a:ext cx="5618922" cy="0"/>
+          </a:xfrm>
+          <a:prstGeom prst="line">
+            <a:avLst/>
+          </a:prstGeom>
+          <a:ln w="38100"/>
+        </p:spPr>
+        <p:style>
+          <a:lnRef idx="3">
+            <a:schemeClr val="dk1"/>
+          </a:lnRef>
+          <a:fillRef idx="0">
+            <a:schemeClr val="dk1"/>
+          </a:fillRef>
+          <a:effectRef idx="2">
+            <a:schemeClr val="dk1"/>
+          </a:effectRef>
+          <a:fontRef idx="minor">
+            <a:schemeClr val="tx1"/>
+          </a:fontRef>
+        </p:style>
+      </p:cxnSp>
+      <p:sp>
+        <p:nvSpPr>
+          <p:cNvPr id="17" name="TextBox 16"/>
+          <p:cNvSpPr txBox="1"/>
+          <p:nvPr/>
+        </p:nvSpPr>
+        <p:spPr>
+          <a:xfrm>
+            <a:off x="6003235" y="1461147"/>
+            <a:ext cx="1272208" cy="646331"/>
+          </a:xfrm>
+          <a:prstGeom prst="rect">
+            <a:avLst/>
+          </a:prstGeom>
+          <a:noFill/>
+        </p:spPr>
+        <p:txBody>
+          <a:bodyPr wrap="square" rtlCol="0">
+            <a:spAutoFit/>
+          </a:bodyPr>
           <a:lstStyle/>
           <a:p>
-            <a:endParaRPr lang="en-PH"/>
+            <a:pPr algn="ctr"/>
+            <a:r>
+              <a:rPr lang="en-PH" sz="3600" dirty="0">
+                <a:latin typeface="Arial" panose="020B0604020202020204" pitchFamily="34" charset="0"/>
+                <a:cs typeface="Arial" panose="020B0604020202020204" pitchFamily="34" charset="0"/>
+              </a:rPr>
+              <a:t>=</a:t>
+            </a:r>
+          </a:p>
+        </p:txBody>
+      </p:sp>
+      <p:sp>
+        <p:nvSpPr>
+          <p:cNvPr id="18" name="TextBox 17"/>
+          <p:cNvSpPr txBox="1"/>
+          <p:nvPr/>
+        </p:nvSpPr>
+        <p:spPr>
+          <a:xfrm>
+            <a:off x="7275443" y="952339"/>
+            <a:ext cx="3379304" cy="1569660"/>
+          </a:xfrm>
+          <a:prstGeom prst="rect">
+            <a:avLst/>
+          </a:prstGeom>
+          <a:noFill/>
+        </p:spPr>
+        <p:txBody>
+          <a:bodyPr wrap="square" rtlCol="0">
+            <a:spAutoFit/>
+          </a:bodyPr>
+          <a:lstStyle/>
+          <a:p>
+            <a:pPr algn="ctr">
+              <a:lnSpc>
+                <a:spcPct val="150000"/>
+              </a:lnSpc>
+            </a:pPr>
+            <a:r>
+              <a:rPr lang="en-PH" sz="3200" dirty="0">
+                <a:latin typeface="Arial" panose="020B0604020202020204" pitchFamily="34" charset="0"/>
+                <a:cs typeface="Arial" panose="020B0604020202020204" pitchFamily="34" charset="0"/>
+              </a:rPr>
+              <a:t>PHP 69,000.00</a:t>
+            </a:r>
+          </a:p>
+          <a:p>
+            <a:pPr algn="ctr">
+              <a:lnSpc>
+                <a:spcPct val="150000"/>
+              </a:lnSpc>
+            </a:pPr>
+            <a:r>
+              <a:rPr lang="en-PH" sz="3200" dirty="0">
+                <a:latin typeface="Arial" panose="020B0604020202020204" pitchFamily="34" charset="0"/>
+                <a:cs typeface="Arial" panose="020B0604020202020204" pitchFamily="34" charset="0"/>
+              </a:rPr>
+              <a:t>7</a:t>
+            </a:r>
+          </a:p>
+        </p:txBody>
+      </p:sp>
+      <p:cxnSp>
+        <p:nvCxnSpPr>
+          <p:cNvPr id="22" name="Straight Connector 21"/>
+          <p:cNvCxnSpPr>
+            <a:cxnSpLocks/>
+          </p:cNvCxnSpPr>
+          <p:nvPr/>
+        </p:nvCxnSpPr>
+        <p:spPr>
+          <a:xfrm>
+            <a:off x="7275443" y="1784313"/>
+            <a:ext cx="3379304" cy="0"/>
+          </a:xfrm>
+          <a:prstGeom prst="line">
+            <a:avLst/>
+          </a:prstGeom>
+          <a:ln w="38100"/>
+        </p:spPr>
+        <p:style>
+          <a:lnRef idx="3">
+            <a:schemeClr val="dk1"/>
+          </a:lnRef>
+          <a:fillRef idx="0">
+            <a:schemeClr val="dk1"/>
+          </a:fillRef>
+          <a:effectRef idx="2">
+            <a:schemeClr val="dk1"/>
+          </a:effectRef>
+          <a:fontRef idx="minor">
+            <a:schemeClr val="tx1"/>
+          </a:fontRef>
+        </p:style>
+      </p:cxnSp>
+      <p:sp>
+        <p:nvSpPr>
+          <p:cNvPr id="23" name="TextBox 22"/>
+          <p:cNvSpPr txBox="1"/>
+          <p:nvPr/>
+        </p:nvSpPr>
+        <p:spPr>
+          <a:xfrm>
+            <a:off x="357808" y="3604591"/>
+            <a:ext cx="6096000" cy="646331"/>
+          </a:xfrm>
+          <a:prstGeom prst="rect">
+            <a:avLst/>
+          </a:prstGeom>
+          <a:noFill/>
+        </p:spPr>
+        <p:txBody>
+          <a:bodyPr wrap="square" rtlCol="0">
+            <a:spAutoFit/>
+          </a:bodyPr>
+          <a:lstStyle/>
+          <a:p>
+            <a:r>
+              <a:rPr lang="en-PH" sz="3600" b="1" dirty="0">
+                <a:latin typeface="Arial" panose="020B0604020202020204" pitchFamily="34" charset="0"/>
+                <a:cs typeface="Arial" panose="020B0604020202020204" pitchFamily="34" charset="0"/>
+              </a:rPr>
+              <a:t>Annual Per Capita Income</a:t>
+            </a:r>
+          </a:p>
+        </p:txBody>
+      </p:sp>
+      <p:sp>
+        <p:nvSpPr>
+          <p:cNvPr id="24" name="TextBox 23"/>
+          <p:cNvSpPr txBox="1"/>
+          <p:nvPr/>
+        </p:nvSpPr>
+        <p:spPr>
+          <a:xfrm>
+            <a:off x="6003235" y="3604591"/>
+            <a:ext cx="1272208" cy="646331"/>
+          </a:xfrm>
+          <a:prstGeom prst="rect">
+            <a:avLst/>
+          </a:prstGeom>
+          <a:noFill/>
+        </p:spPr>
+        <p:txBody>
+          <a:bodyPr wrap="square" rtlCol="0">
+            <a:spAutoFit/>
+          </a:bodyPr>
+          <a:lstStyle/>
+          <a:p>
+            <a:pPr algn="ctr"/>
+            <a:r>
+              <a:rPr lang="en-PH" sz="3600" dirty="0">
+                <a:latin typeface="Arial" panose="020B0604020202020204" pitchFamily="34" charset="0"/>
+                <a:cs typeface="Arial" panose="020B0604020202020204" pitchFamily="34" charset="0"/>
+              </a:rPr>
+              <a:t>=</a:t>
+            </a:r>
+          </a:p>
+        </p:txBody>
+      </p:sp>
+      <p:sp>
+        <p:nvSpPr>
+          <p:cNvPr id="25" name="TextBox 24"/>
+          <p:cNvSpPr txBox="1"/>
+          <p:nvPr/>
+        </p:nvSpPr>
+        <p:spPr>
+          <a:xfrm>
+            <a:off x="7460974" y="3604590"/>
+            <a:ext cx="3578087" cy="707886"/>
+          </a:xfrm>
+          <a:prstGeom prst="rect">
+            <a:avLst/>
+          </a:prstGeom>
+          <a:noFill/>
+        </p:spPr>
+        <p:txBody>
+          <a:bodyPr wrap="square" rtlCol="0">
+            <a:spAutoFit/>
+          </a:bodyPr>
+          <a:lstStyle/>
+          <a:p>
+            <a:r>
+              <a:rPr lang="en-PH" sz="4000" b="1" dirty="0">
+                <a:ln w="9525">
+                  <a:solidFill>
+                    <a:schemeClr val="bg1"/>
+                  </a:solidFill>
+                  <a:prstDash val="solid"/>
+                </a:ln>
+                <a:effectLst>
+                  <a:outerShdw blurRad="12700" dist="38100" dir="2700000" algn="tl" rotWithShape="0">
+                    <a:schemeClr val="bg1">
+                      <a:lumMod val="50000"/>
+                    </a:schemeClr>
+                  </a:outerShdw>
+                </a:effectLst>
+                <a:latin typeface="Arial" panose="020B0604020202020204" pitchFamily="34" charset="0"/>
+                <a:cs typeface="Arial" panose="020B0604020202020204" pitchFamily="34" charset="0"/>
+              </a:rPr>
+              <a:t>PHP 9,857.14</a:t>
+            </a:r>
+          </a:p>
+        </p:txBody>
+      </p:sp>
+      <p:sp>
+        <p:nvSpPr>
+          <p:cNvPr id="26" name="TextBox 25"/>
+          <p:cNvSpPr txBox="1"/>
+          <p:nvPr/>
+        </p:nvSpPr>
+        <p:spPr>
+          <a:xfrm>
+            <a:off x="2020957" y="4716870"/>
+            <a:ext cx="3578087" cy="707886"/>
+          </a:xfrm>
+          <a:prstGeom prst="rect">
+            <a:avLst/>
+          </a:prstGeom>
+          <a:noFill/>
+        </p:spPr>
+        <p:txBody>
+          <a:bodyPr wrap="square" rtlCol="0">
+            <a:spAutoFit/>
+          </a:bodyPr>
+          <a:lstStyle/>
+          <a:p>
+            <a:r>
+              <a:rPr lang="en-PH" sz="4000" b="1" dirty="0">
+                <a:ln w="9525">
+                  <a:solidFill>
+                    <a:schemeClr val="bg1"/>
+                  </a:solidFill>
+                  <a:prstDash val="solid"/>
+                </a:ln>
+                <a:effectLst>
+                  <a:outerShdw blurRad="12700" dist="38100" dir="2700000" algn="tl" rotWithShape="0">
+                    <a:schemeClr val="bg1">
+                      <a:lumMod val="50000"/>
+                    </a:schemeClr>
+                  </a:outerShdw>
+                </a:effectLst>
+                <a:latin typeface="Arial" panose="020B0604020202020204" pitchFamily="34" charset="0"/>
+                <a:cs typeface="Arial" panose="020B0604020202020204" pitchFamily="34" charset="0"/>
+              </a:rPr>
+              <a:t>PHP 9,857.14</a:t>
+            </a:r>
+          </a:p>
+        </p:txBody>
+      </p:sp>
+      <p:sp>
+        <p:nvSpPr>
+          <p:cNvPr id="27" name="TextBox 26"/>
+          <p:cNvSpPr txBox="1"/>
+          <p:nvPr/>
+        </p:nvSpPr>
+        <p:spPr>
+          <a:xfrm>
+            <a:off x="5506279" y="4747647"/>
+            <a:ext cx="1272208" cy="646331"/>
+          </a:xfrm>
+          <a:prstGeom prst="rect">
+            <a:avLst/>
+          </a:prstGeom>
+          <a:noFill/>
+        </p:spPr>
+        <p:txBody>
+          <a:bodyPr wrap="square" rtlCol="0">
+            <a:spAutoFit/>
+          </a:bodyPr>
+          <a:lstStyle/>
+          <a:p>
+            <a:pPr algn="ctr"/>
+            <a:r>
+              <a:rPr lang="en-PH" sz="3600" dirty="0">
+                <a:latin typeface="Arial" panose="020B0604020202020204" pitchFamily="34" charset="0"/>
+                <a:cs typeface="Arial" panose="020B0604020202020204" pitchFamily="34" charset="0"/>
+              </a:rPr>
+              <a:t>&lt;</a:t>
+            </a:r>
+          </a:p>
+        </p:txBody>
+      </p:sp>
+      <p:sp>
+        <p:nvSpPr>
+          <p:cNvPr id="28" name="TextBox 27"/>
+          <p:cNvSpPr txBox="1"/>
+          <p:nvPr/>
+        </p:nvSpPr>
+        <p:spPr>
+          <a:xfrm>
+            <a:off x="6778487" y="4716869"/>
+            <a:ext cx="4022035" cy="707886"/>
+          </a:xfrm>
+          <a:prstGeom prst="rect">
+            <a:avLst/>
+          </a:prstGeom>
+          <a:noFill/>
+        </p:spPr>
+        <p:txBody>
+          <a:bodyPr wrap="square" rtlCol="0">
+            <a:spAutoFit/>
+          </a:bodyPr>
+          <a:lstStyle/>
+          <a:p>
+            <a:r>
+              <a:rPr lang="en-PH" sz="4000" b="1" dirty="0">
+                <a:ln w="9525">
+                  <a:solidFill>
+                    <a:schemeClr val="bg1"/>
+                  </a:solidFill>
+                  <a:prstDash val="solid"/>
+                </a:ln>
+                <a:effectLst>
+                  <a:outerShdw blurRad="12700" dist="38100" dir="2700000" algn="tl" rotWithShape="0">
+                    <a:schemeClr val="bg1">
+                      <a:lumMod val="50000"/>
+                    </a:schemeClr>
+                  </a:outerShdw>
+                </a:effectLst>
+                <a:latin typeface="Arial" panose="020B0604020202020204" pitchFamily="34" charset="0"/>
+                <a:cs typeface="Arial" panose="020B0604020202020204" pitchFamily="34" charset="0"/>
+              </a:rPr>
+              <a:t>PHP 20,344.00</a:t>
+            </a:r>
+          </a:p>
+        </p:txBody>
+      </p:sp>
+      <p:sp>
+        <p:nvSpPr>
+          <p:cNvPr id="29" name="TextBox 28"/>
+          <p:cNvSpPr txBox="1"/>
+          <p:nvPr/>
+        </p:nvSpPr>
+        <p:spPr>
+          <a:xfrm rot="19379838">
+            <a:off x="1901268" y="2273833"/>
+            <a:ext cx="6692348" cy="1323439"/>
+          </a:xfrm>
+          <a:prstGeom prst="rect">
+            <a:avLst/>
+          </a:prstGeom>
+        </p:spPr>
+        <p:style>
+          <a:lnRef idx="3">
+            <a:schemeClr val="lt1"/>
+          </a:lnRef>
+          <a:fillRef idx="1">
+            <a:schemeClr val="accent1"/>
+          </a:fillRef>
+          <a:effectRef idx="1">
+            <a:schemeClr val="accent1"/>
+          </a:effectRef>
+          <a:fontRef idx="minor">
+            <a:schemeClr val="lt1"/>
+          </a:fontRef>
+        </p:style>
+        <p:txBody>
+          <a:bodyPr wrap="square" rtlCol="0">
+            <a:spAutoFit/>
+          </a:bodyPr>
+          <a:lstStyle/>
+          <a:p>
+            <a:pPr algn="ctr"/>
+            <a:r>
+              <a:rPr lang="en-PH" sz="8000" dirty="0"/>
+              <a:t>POOR</a:t>
+            </a:r>
           </a:p>
         </p:txBody>
       </p:sp>
     </p:spTree>
     <p:extLst>
       <p:ext uri="{BB962C8B-B14F-4D97-AF65-F5344CB8AC3E}">
-        <p14:creationId xmlns:p14="http://schemas.microsoft.com/office/powerpoint/2010/main" val="2671597126"/>
+        <p14:creationId xmlns:p14="http://schemas.microsoft.com/office/powerpoint/2010/main" val="3674408851"/>
       </p:ext>
     </p:extLst>
   </p:cSld>
   <p:clrMapOvr>
     <a:masterClrMapping/>
   </p:clrMapOvr>
+  <p:timing>
+    <p:tnLst>
+      <p:par>
+        <p:cTn id="1" dur="indefinite" restart="never" nodeType="tmRoot">
+          <p:childTnLst>
+            <p:seq concurrent="1" nextAc="seek">
+              <p:cTn id="2" dur="indefinite" nodeType="mainSeq">
+                <p:childTnLst>
+                  <p:par>
+                    <p:cTn id="3" fill="hold">
+                      <p:stCondLst>
+                        <p:cond delay="indefinite"/>
+                      </p:stCondLst>
+                      <p:childTnLst>
+                        <p:par>
+                          <p:cTn id="4" fill="hold">
+                            <p:stCondLst>
+                              <p:cond delay="0"/>
+                            </p:stCondLst>
+                            <p:childTnLst>
+                              <p:par>
+                                <p:cTn id="5" presetID="14" presetClass="entr" presetSubtype="10" fill="hold" grpId="0" nodeType="clickEffect">
+                                  <p:stCondLst>
+                                    <p:cond delay="0"/>
+                                  </p:stCondLst>
+                                  <p:childTnLst>
+                                    <p:set>
+                                      <p:cBhvr>
+                                        <p:cTn id="6" dur="1" fill="hold">
+                                          <p:stCondLst>
+                                            <p:cond delay="0"/>
+                                          </p:stCondLst>
+                                        </p:cTn>
+                                        <p:tgtEl>
+                                          <p:spTgt spid="14"/>
+                                        </p:tgtEl>
+                                        <p:attrNameLst>
+                                          <p:attrName>style.visibility</p:attrName>
+                                        </p:attrNameLst>
+                                      </p:cBhvr>
+                                      <p:to>
+                                        <p:strVal val="visible"/>
+                                      </p:to>
+                                    </p:set>
+                                    <p:animEffect transition="in" filter="randombar(horizontal)">
+                                      <p:cBhvr>
+                                        <p:cTn id="7" dur="500"/>
+                                        <p:tgtEl>
+                                          <p:spTgt spid="14"/>
+                                        </p:tgtEl>
+                                      </p:cBhvr>
+                                    </p:animEffect>
+                                  </p:childTnLst>
+                                </p:cTn>
+                              </p:par>
+                            </p:childTnLst>
+                          </p:cTn>
+                        </p:par>
+                      </p:childTnLst>
+                    </p:cTn>
+                  </p:par>
+                  <p:par>
+                    <p:cTn id="8" fill="hold">
+                      <p:stCondLst>
+                        <p:cond delay="indefinite"/>
+                      </p:stCondLst>
+                      <p:childTnLst>
+                        <p:par>
+                          <p:cTn id="9" fill="hold">
+                            <p:stCondLst>
+                              <p:cond delay="0"/>
+                            </p:stCondLst>
+                            <p:childTnLst>
+                              <p:par>
+                                <p:cTn id="10" presetID="53" presetClass="entr" presetSubtype="16" fill="hold" grpId="0" nodeType="clickEffect">
+                                  <p:stCondLst>
+                                    <p:cond delay="0"/>
+                                  </p:stCondLst>
+                                  <p:childTnLst>
+                                    <p:set>
+                                      <p:cBhvr>
+                                        <p:cTn id="11" dur="1" fill="hold">
+                                          <p:stCondLst>
+                                            <p:cond delay="0"/>
+                                          </p:stCondLst>
+                                        </p:cTn>
+                                        <p:tgtEl>
+                                          <p:spTgt spid="18"/>
+                                        </p:tgtEl>
+                                        <p:attrNameLst>
+                                          <p:attrName>style.visibility</p:attrName>
+                                        </p:attrNameLst>
+                                      </p:cBhvr>
+                                      <p:to>
+                                        <p:strVal val="visible"/>
+                                      </p:to>
+                                    </p:set>
+                                    <p:anim calcmode="lin" valueType="num">
+                                      <p:cBhvr>
+                                        <p:cTn id="12" dur="500" fill="hold"/>
+                                        <p:tgtEl>
+                                          <p:spTgt spid="18"/>
+                                        </p:tgtEl>
+                                        <p:attrNameLst>
+                                          <p:attrName>ppt_w</p:attrName>
+                                        </p:attrNameLst>
+                                      </p:cBhvr>
+                                      <p:tavLst>
+                                        <p:tav tm="0">
+                                          <p:val>
+                                            <p:fltVal val="0"/>
+                                          </p:val>
+                                        </p:tav>
+                                        <p:tav tm="100000">
+                                          <p:val>
+                                            <p:strVal val="#ppt_w"/>
+                                          </p:val>
+                                        </p:tav>
+                                      </p:tavLst>
+                                    </p:anim>
+                                    <p:anim calcmode="lin" valueType="num">
+                                      <p:cBhvr>
+                                        <p:cTn id="13" dur="500" fill="hold"/>
+                                        <p:tgtEl>
+                                          <p:spTgt spid="18"/>
+                                        </p:tgtEl>
+                                        <p:attrNameLst>
+                                          <p:attrName>ppt_h</p:attrName>
+                                        </p:attrNameLst>
+                                      </p:cBhvr>
+                                      <p:tavLst>
+                                        <p:tav tm="0">
+                                          <p:val>
+                                            <p:fltVal val="0"/>
+                                          </p:val>
+                                        </p:tav>
+                                        <p:tav tm="100000">
+                                          <p:val>
+                                            <p:strVal val="#ppt_h"/>
+                                          </p:val>
+                                        </p:tav>
+                                      </p:tavLst>
+                                    </p:anim>
+                                    <p:animEffect transition="in" filter="fade">
+                                      <p:cBhvr>
+                                        <p:cTn id="14" dur="500"/>
+                                        <p:tgtEl>
+                                          <p:spTgt spid="18"/>
+                                        </p:tgtEl>
+                                      </p:cBhvr>
+                                    </p:animEffect>
+                                  </p:childTnLst>
+                                </p:cTn>
+                              </p:par>
+                            </p:childTnLst>
+                          </p:cTn>
+                        </p:par>
+                      </p:childTnLst>
+                    </p:cTn>
+                  </p:par>
+                  <p:par>
+                    <p:cTn id="15" fill="hold">
+                      <p:stCondLst>
+                        <p:cond delay="indefinite"/>
+                      </p:stCondLst>
+                      <p:childTnLst>
+                        <p:par>
+                          <p:cTn id="16" fill="hold">
+                            <p:stCondLst>
+                              <p:cond delay="0"/>
+                            </p:stCondLst>
+                            <p:childTnLst>
+                              <p:par>
+                                <p:cTn id="17" presetID="26" presetClass="entr" presetSubtype="0" fill="hold" grpId="0" nodeType="clickEffect">
+                                  <p:stCondLst>
+                                    <p:cond delay="0"/>
+                                  </p:stCondLst>
+                                  <p:childTnLst>
+                                    <p:set>
+                                      <p:cBhvr>
+                                        <p:cTn id="18" dur="1" fill="hold">
+                                          <p:stCondLst>
+                                            <p:cond delay="0"/>
+                                          </p:stCondLst>
+                                        </p:cTn>
+                                        <p:tgtEl>
+                                          <p:spTgt spid="23"/>
+                                        </p:tgtEl>
+                                        <p:attrNameLst>
+                                          <p:attrName>style.visibility</p:attrName>
+                                        </p:attrNameLst>
+                                      </p:cBhvr>
+                                      <p:to>
+                                        <p:strVal val="visible"/>
+                                      </p:to>
+                                    </p:set>
+                                    <p:animEffect transition="in" filter="wipe(down)">
+                                      <p:cBhvr>
+                                        <p:cTn id="19" dur="580">
+                                          <p:stCondLst>
+                                            <p:cond delay="0"/>
+                                          </p:stCondLst>
+                                        </p:cTn>
+                                        <p:tgtEl>
+                                          <p:spTgt spid="23"/>
+                                        </p:tgtEl>
+                                      </p:cBhvr>
+                                    </p:animEffect>
+                                    <p:anim calcmode="lin" valueType="num">
+                                      <p:cBhvr>
+                                        <p:cTn id="20" dur="1822" tmFilter="0,0; 0.14,0.36; 0.43,0.73; 0.71,0.91; 1.0,1.0">
+                                          <p:stCondLst>
+                                            <p:cond delay="0"/>
+                                          </p:stCondLst>
+                                        </p:cTn>
+                                        <p:tgtEl>
+                                          <p:spTgt spid="23"/>
+                                        </p:tgtEl>
+                                        <p:attrNameLst>
+                                          <p:attrName>ppt_x</p:attrName>
+                                        </p:attrNameLst>
+                                      </p:cBhvr>
+                                      <p:tavLst>
+                                        <p:tav tm="0">
+                                          <p:val>
+                                            <p:strVal val="#ppt_x-0.25"/>
+                                          </p:val>
+                                        </p:tav>
+                                        <p:tav tm="100000">
+                                          <p:val>
+                                            <p:strVal val="#ppt_x"/>
+                                          </p:val>
+                                        </p:tav>
+                                      </p:tavLst>
+                                    </p:anim>
+                                    <p:anim calcmode="lin" valueType="num">
+                                      <p:cBhvr>
+                                        <p:cTn id="21" dur="664" tmFilter="0.0,0.0; 0.25,0.07; 0.50,0.2; 0.75,0.467; 1.0,1.0">
+                                          <p:stCondLst>
+                                            <p:cond delay="0"/>
+                                          </p:stCondLst>
+                                        </p:cTn>
+                                        <p:tgtEl>
+                                          <p:spTgt spid="23"/>
+                                        </p:tgtEl>
+                                        <p:attrNameLst>
+                                          <p:attrName>ppt_y</p:attrName>
+                                        </p:attrNameLst>
+                                      </p:cBhvr>
+                                      <p:tavLst>
+                                        <p:tav tm="0" fmla="#ppt_y-sin(pi*$)/3">
+                                          <p:val>
+                                            <p:fltVal val="0.5"/>
+                                          </p:val>
+                                        </p:tav>
+                                        <p:tav tm="100000">
+                                          <p:val>
+                                            <p:fltVal val="1"/>
+                                          </p:val>
+                                        </p:tav>
+                                      </p:tavLst>
+                                    </p:anim>
+                                    <p:anim calcmode="lin" valueType="num">
+                                      <p:cBhvr>
+                                        <p:cTn id="22" dur="664" tmFilter="0, 0; 0.125,0.2665; 0.25,0.4; 0.375,0.465; 0.5,0.5;  0.625,0.535; 0.75,0.6; 0.875,0.7335; 1,1">
+                                          <p:stCondLst>
+                                            <p:cond delay="664"/>
+                                          </p:stCondLst>
+                                        </p:cTn>
+                                        <p:tgtEl>
+                                          <p:spTgt spid="23"/>
+                                        </p:tgtEl>
+                                        <p:attrNameLst>
+                                          <p:attrName>ppt_y</p:attrName>
+                                        </p:attrNameLst>
+                                      </p:cBhvr>
+                                      <p:tavLst>
+                                        <p:tav tm="0" fmla="#ppt_y-sin(pi*$)/9">
+                                          <p:val>
+                                            <p:fltVal val="0"/>
+                                          </p:val>
+                                        </p:tav>
+                                        <p:tav tm="100000">
+                                          <p:val>
+                                            <p:fltVal val="1"/>
+                                          </p:val>
+                                        </p:tav>
+                                      </p:tavLst>
+                                    </p:anim>
+                                    <p:anim calcmode="lin" valueType="num">
+                                      <p:cBhvr>
+                                        <p:cTn id="23" dur="332" tmFilter="0, 0; 0.125,0.2665; 0.25,0.4; 0.375,0.465; 0.5,0.5;  0.625,0.535; 0.75,0.6; 0.875,0.7335; 1,1">
+                                          <p:stCondLst>
+                                            <p:cond delay="1324"/>
+                                          </p:stCondLst>
+                                        </p:cTn>
+                                        <p:tgtEl>
+                                          <p:spTgt spid="23"/>
+                                        </p:tgtEl>
+                                        <p:attrNameLst>
+                                          <p:attrName>ppt_y</p:attrName>
+                                        </p:attrNameLst>
+                                      </p:cBhvr>
+                                      <p:tavLst>
+                                        <p:tav tm="0" fmla="#ppt_y-sin(pi*$)/27">
+                                          <p:val>
+                                            <p:fltVal val="0"/>
+                                          </p:val>
+                                        </p:tav>
+                                        <p:tav tm="100000">
+                                          <p:val>
+                                            <p:fltVal val="1"/>
+                                          </p:val>
+                                        </p:tav>
+                                      </p:tavLst>
+                                    </p:anim>
+                                    <p:anim calcmode="lin" valueType="num">
+                                      <p:cBhvr>
+                                        <p:cTn id="24" dur="164" tmFilter="0, 0; 0.125,0.2665; 0.25,0.4; 0.375,0.465; 0.5,0.5;  0.625,0.535; 0.75,0.6; 0.875,0.7335; 1,1">
+                                          <p:stCondLst>
+                                            <p:cond delay="1656"/>
+                                          </p:stCondLst>
+                                        </p:cTn>
+                                        <p:tgtEl>
+                                          <p:spTgt spid="23"/>
+                                        </p:tgtEl>
+                                        <p:attrNameLst>
+                                          <p:attrName>ppt_y</p:attrName>
+                                        </p:attrNameLst>
+                                      </p:cBhvr>
+                                      <p:tavLst>
+                                        <p:tav tm="0" fmla="#ppt_y-sin(pi*$)/81">
+                                          <p:val>
+                                            <p:fltVal val="0"/>
+                                          </p:val>
+                                        </p:tav>
+                                        <p:tav tm="100000">
+                                          <p:val>
+                                            <p:fltVal val="1"/>
+                                          </p:val>
+                                        </p:tav>
+                                      </p:tavLst>
+                                    </p:anim>
+                                    <p:animScale>
+                                      <p:cBhvr>
+                                        <p:cTn id="25" dur="26">
+                                          <p:stCondLst>
+                                            <p:cond delay="650"/>
+                                          </p:stCondLst>
+                                        </p:cTn>
+                                        <p:tgtEl>
+                                          <p:spTgt spid="23"/>
+                                        </p:tgtEl>
+                                      </p:cBhvr>
+                                      <p:to x="100000" y="60000"/>
+                                    </p:animScale>
+                                    <p:animScale>
+                                      <p:cBhvr>
+                                        <p:cTn id="26" dur="166" decel="50000">
+                                          <p:stCondLst>
+                                            <p:cond delay="676"/>
+                                          </p:stCondLst>
+                                        </p:cTn>
+                                        <p:tgtEl>
+                                          <p:spTgt spid="23"/>
+                                        </p:tgtEl>
+                                      </p:cBhvr>
+                                      <p:to x="100000" y="100000"/>
+                                    </p:animScale>
+                                    <p:animScale>
+                                      <p:cBhvr>
+                                        <p:cTn id="27" dur="26">
+                                          <p:stCondLst>
+                                            <p:cond delay="1312"/>
+                                          </p:stCondLst>
+                                        </p:cTn>
+                                        <p:tgtEl>
+                                          <p:spTgt spid="23"/>
+                                        </p:tgtEl>
+                                      </p:cBhvr>
+                                      <p:to x="100000" y="80000"/>
+                                    </p:animScale>
+                                    <p:animScale>
+                                      <p:cBhvr>
+                                        <p:cTn id="28" dur="166" decel="50000">
+                                          <p:stCondLst>
+                                            <p:cond delay="1338"/>
+                                          </p:stCondLst>
+                                        </p:cTn>
+                                        <p:tgtEl>
+                                          <p:spTgt spid="23"/>
+                                        </p:tgtEl>
+                                      </p:cBhvr>
+                                      <p:to x="100000" y="100000"/>
+                                    </p:animScale>
+                                    <p:animScale>
+                                      <p:cBhvr>
+                                        <p:cTn id="29" dur="26">
+                                          <p:stCondLst>
+                                            <p:cond delay="1642"/>
+                                          </p:stCondLst>
+                                        </p:cTn>
+                                        <p:tgtEl>
+                                          <p:spTgt spid="23"/>
+                                        </p:tgtEl>
+                                      </p:cBhvr>
+                                      <p:to x="100000" y="90000"/>
+                                    </p:animScale>
+                                    <p:animScale>
+                                      <p:cBhvr>
+                                        <p:cTn id="30" dur="166" decel="50000">
+                                          <p:stCondLst>
+                                            <p:cond delay="1668"/>
+                                          </p:stCondLst>
+                                        </p:cTn>
+                                        <p:tgtEl>
+                                          <p:spTgt spid="23"/>
+                                        </p:tgtEl>
+                                      </p:cBhvr>
+                                      <p:to x="100000" y="100000"/>
+                                    </p:animScale>
+                                    <p:animScale>
+                                      <p:cBhvr>
+                                        <p:cTn id="31" dur="26">
+                                          <p:stCondLst>
+                                            <p:cond delay="1808"/>
+                                          </p:stCondLst>
+                                        </p:cTn>
+                                        <p:tgtEl>
+                                          <p:spTgt spid="23"/>
+                                        </p:tgtEl>
+                                      </p:cBhvr>
+                                      <p:to x="100000" y="95000"/>
+                                    </p:animScale>
+                                    <p:animScale>
+                                      <p:cBhvr>
+                                        <p:cTn id="32" dur="166" decel="50000">
+                                          <p:stCondLst>
+                                            <p:cond delay="1834"/>
+                                          </p:stCondLst>
+                                        </p:cTn>
+                                        <p:tgtEl>
+                                          <p:spTgt spid="23"/>
+                                        </p:tgtEl>
+                                      </p:cBhvr>
+                                      <p:to x="100000" y="100000"/>
+                                    </p:animScale>
+                                  </p:childTnLst>
+                                </p:cTn>
+                              </p:par>
+                            </p:childTnLst>
+                          </p:cTn>
+                        </p:par>
+                      </p:childTnLst>
+                    </p:cTn>
+                  </p:par>
+                  <p:par>
+                    <p:cTn id="33" fill="hold">
+                      <p:stCondLst>
+                        <p:cond delay="indefinite"/>
+                      </p:stCondLst>
+                      <p:childTnLst>
+                        <p:par>
+                          <p:cTn id="34" fill="hold">
+                            <p:stCondLst>
+                              <p:cond delay="0"/>
+                            </p:stCondLst>
+                            <p:childTnLst>
+                              <p:par>
+                                <p:cTn id="35" presetID="45" presetClass="entr" presetSubtype="0" fill="hold" grpId="0" nodeType="clickEffect">
+                                  <p:stCondLst>
+                                    <p:cond delay="0"/>
+                                  </p:stCondLst>
+                                  <p:childTnLst>
+                                    <p:set>
+                                      <p:cBhvr>
+                                        <p:cTn id="36" dur="1" fill="hold">
+                                          <p:stCondLst>
+                                            <p:cond delay="0"/>
+                                          </p:stCondLst>
+                                        </p:cTn>
+                                        <p:tgtEl>
+                                          <p:spTgt spid="25"/>
+                                        </p:tgtEl>
+                                        <p:attrNameLst>
+                                          <p:attrName>style.visibility</p:attrName>
+                                        </p:attrNameLst>
+                                      </p:cBhvr>
+                                      <p:to>
+                                        <p:strVal val="visible"/>
+                                      </p:to>
+                                    </p:set>
+                                    <p:animEffect transition="in" filter="fade">
+                                      <p:cBhvr>
+                                        <p:cTn id="37" dur="2000"/>
+                                        <p:tgtEl>
+                                          <p:spTgt spid="25"/>
+                                        </p:tgtEl>
+                                      </p:cBhvr>
+                                    </p:animEffect>
+                                    <p:anim calcmode="lin" valueType="num">
+                                      <p:cBhvr>
+                                        <p:cTn id="38" dur="2000" fill="hold"/>
+                                        <p:tgtEl>
+                                          <p:spTgt spid="25"/>
+                                        </p:tgtEl>
+                                        <p:attrNameLst>
+                                          <p:attrName>ppt_w</p:attrName>
+                                        </p:attrNameLst>
+                                      </p:cBhvr>
+                                      <p:tavLst>
+                                        <p:tav tm="0" fmla="#ppt_w*sin(2.5*pi*$)">
+                                          <p:val>
+                                            <p:fltVal val="0"/>
+                                          </p:val>
+                                        </p:tav>
+                                        <p:tav tm="100000">
+                                          <p:val>
+                                            <p:fltVal val="1"/>
+                                          </p:val>
+                                        </p:tav>
+                                      </p:tavLst>
+                                    </p:anim>
+                                    <p:anim calcmode="lin" valueType="num">
+                                      <p:cBhvr>
+                                        <p:cTn id="39" dur="2000" fill="hold"/>
+                                        <p:tgtEl>
+                                          <p:spTgt spid="25"/>
+                                        </p:tgtEl>
+                                        <p:attrNameLst>
+                                          <p:attrName>ppt_h</p:attrName>
+                                        </p:attrNameLst>
+                                      </p:cBhvr>
+                                      <p:tavLst>
+                                        <p:tav tm="0">
+                                          <p:val>
+                                            <p:strVal val="#ppt_h"/>
+                                          </p:val>
+                                        </p:tav>
+                                        <p:tav tm="100000">
+                                          <p:val>
+                                            <p:strVal val="#ppt_h"/>
+                                          </p:val>
+                                        </p:tav>
+                                      </p:tavLst>
+                                    </p:anim>
+                                  </p:childTnLst>
+                                </p:cTn>
+                              </p:par>
+                            </p:childTnLst>
+                          </p:cTn>
+                        </p:par>
+                      </p:childTnLst>
+                    </p:cTn>
+                  </p:par>
+                  <p:par>
+                    <p:cTn id="40" fill="hold">
+                      <p:stCondLst>
+                        <p:cond delay="indefinite"/>
+                      </p:stCondLst>
+                      <p:childTnLst>
+                        <p:par>
+                          <p:cTn id="41" fill="hold">
+                            <p:stCondLst>
+                              <p:cond delay="0"/>
+                            </p:stCondLst>
+                            <p:childTnLst>
+                              <p:par>
+                                <p:cTn id="42" presetID="45" presetClass="entr" presetSubtype="0" fill="hold" grpId="0" nodeType="clickEffect">
+                                  <p:stCondLst>
+                                    <p:cond delay="0"/>
+                                  </p:stCondLst>
+                                  <p:childTnLst>
+                                    <p:set>
+                                      <p:cBhvr>
+                                        <p:cTn id="43" dur="1" fill="hold">
+                                          <p:stCondLst>
+                                            <p:cond delay="0"/>
+                                          </p:stCondLst>
+                                        </p:cTn>
+                                        <p:tgtEl>
+                                          <p:spTgt spid="26"/>
+                                        </p:tgtEl>
+                                        <p:attrNameLst>
+                                          <p:attrName>style.visibility</p:attrName>
+                                        </p:attrNameLst>
+                                      </p:cBhvr>
+                                      <p:to>
+                                        <p:strVal val="visible"/>
+                                      </p:to>
+                                    </p:set>
+                                    <p:animEffect transition="in" filter="fade">
+                                      <p:cBhvr>
+                                        <p:cTn id="44" dur="2000"/>
+                                        <p:tgtEl>
+                                          <p:spTgt spid="26"/>
+                                        </p:tgtEl>
+                                      </p:cBhvr>
+                                    </p:animEffect>
+                                    <p:anim calcmode="lin" valueType="num">
+                                      <p:cBhvr>
+                                        <p:cTn id="45" dur="2000" fill="hold"/>
+                                        <p:tgtEl>
+                                          <p:spTgt spid="26"/>
+                                        </p:tgtEl>
+                                        <p:attrNameLst>
+                                          <p:attrName>ppt_w</p:attrName>
+                                        </p:attrNameLst>
+                                      </p:cBhvr>
+                                      <p:tavLst>
+                                        <p:tav tm="0" fmla="#ppt_w*sin(2.5*pi*$)">
+                                          <p:val>
+                                            <p:fltVal val="0"/>
+                                          </p:val>
+                                        </p:tav>
+                                        <p:tav tm="100000">
+                                          <p:val>
+                                            <p:fltVal val="1"/>
+                                          </p:val>
+                                        </p:tav>
+                                      </p:tavLst>
+                                    </p:anim>
+                                    <p:anim calcmode="lin" valueType="num">
+                                      <p:cBhvr>
+                                        <p:cTn id="46" dur="2000" fill="hold"/>
+                                        <p:tgtEl>
+                                          <p:spTgt spid="26"/>
+                                        </p:tgtEl>
+                                        <p:attrNameLst>
+                                          <p:attrName>ppt_h</p:attrName>
+                                        </p:attrNameLst>
+                                      </p:cBhvr>
+                                      <p:tavLst>
+                                        <p:tav tm="0">
+                                          <p:val>
+                                            <p:strVal val="#ppt_h"/>
+                                          </p:val>
+                                        </p:tav>
+                                        <p:tav tm="100000">
+                                          <p:val>
+                                            <p:strVal val="#ppt_h"/>
+                                          </p:val>
+                                        </p:tav>
+                                      </p:tavLst>
+                                    </p:anim>
+                                  </p:childTnLst>
+                                </p:cTn>
+                              </p:par>
+                            </p:childTnLst>
+                          </p:cTn>
+                        </p:par>
+                      </p:childTnLst>
+                    </p:cTn>
+                  </p:par>
+                  <p:par>
+                    <p:cTn id="47" fill="hold">
+                      <p:stCondLst>
+                        <p:cond delay="indefinite"/>
+                      </p:stCondLst>
+                      <p:childTnLst>
+                        <p:par>
+                          <p:cTn id="48" fill="hold">
+                            <p:stCondLst>
+                              <p:cond delay="0"/>
+                            </p:stCondLst>
+                            <p:childTnLst>
+                              <p:par>
+                                <p:cTn id="49" presetID="45" presetClass="entr" presetSubtype="0" fill="hold" grpId="0" nodeType="clickEffect">
+                                  <p:stCondLst>
+                                    <p:cond delay="0"/>
+                                  </p:stCondLst>
+                                  <p:childTnLst>
+                                    <p:set>
+                                      <p:cBhvr>
+                                        <p:cTn id="50" dur="1" fill="hold">
+                                          <p:stCondLst>
+                                            <p:cond delay="0"/>
+                                          </p:stCondLst>
+                                        </p:cTn>
+                                        <p:tgtEl>
+                                          <p:spTgt spid="28"/>
+                                        </p:tgtEl>
+                                        <p:attrNameLst>
+                                          <p:attrName>style.visibility</p:attrName>
+                                        </p:attrNameLst>
+                                      </p:cBhvr>
+                                      <p:to>
+                                        <p:strVal val="visible"/>
+                                      </p:to>
+                                    </p:set>
+                                    <p:animEffect transition="in" filter="fade">
+                                      <p:cBhvr>
+                                        <p:cTn id="51" dur="2000"/>
+                                        <p:tgtEl>
+                                          <p:spTgt spid="28"/>
+                                        </p:tgtEl>
+                                      </p:cBhvr>
+                                    </p:animEffect>
+                                    <p:anim calcmode="lin" valueType="num">
+                                      <p:cBhvr>
+                                        <p:cTn id="52" dur="2000" fill="hold"/>
+                                        <p:tgtEl>
+                                          <p:spTgt spid="28"/>
+                                        </p:tgtEl>
+                                        <p:attrNameLst>
+                                          <p:attrName>ppt_w</p:attrName>
+                                        </p:attrNameLst>
+                                      </p:cBhvr>
+                                      <p:tavLst>
+                                        <p:tav tm="0" fmla="#ppt_w*sin(2.5*pi*$)">
+                                          <p:val>
+                                            <p:fltVal val="0"/>
+                                          </p:val>
+                                        </p:tav>
+                                        <p:tav tm="100000">
+                                          <p:val>
+                                            <p:fltVal val="1"/>
+                                          </p:val>
+                                        </p:tav>
+                                      </p:tavLst>
+                                    </p:anim>
+                                    <p:anim calcmode="lin" valueType="num">
+                                      <p:cBhvr>
+                                        <p:cTn id="53" dur="2000" fill="hold"/>
+                                        <p:tgtEl>
+                                          <p:spTgt spid="28"/>
+                                        </p:tgtEl>
+                                        <p:attrNameLst>
+                                          <p:attrName>ppt_h</p:attrName>
+                                        </p:attrNameLst>
+                                      </p:cBhvr>
+                                      <p:tavLst>
+                                        <p:tav tm="0">
+                                          <p:val>
+                                            <p:strVal val="#ppt_h"/>
+                                          </p:val>
+                                        </p:tav>
+                                        <p:tav tm="100000">
+                                          <p:val>
+                                            <p:strVal val="#ppt_h"/>
+                                          </p:val>
+                                        </p:tav>
+                                      </p:tavLst>
+                                    </p:anim>
+                                  </p:childTnLst>
+                                </p:cTn>
+                              </p:par>
+                            </p:childTnLst>
+                          </p:cTn>
+                        </p:par>
+                      </p:childTnLst>
+                    </p:cTn>
+                  </p:par>
+                  <p:par>
+                    <p:cTn id="54" fill="hold">
+                      <p:stCondLst>
+                        <p:cond delay="indefinite"/>
+                      </p:stCondLst>
+                      <p:childTnLst>
+                        <p:par>
+                          <p:cTn id="55" fill="hold">
+                            <p:stCondLst>
+                              <p:cond delay="0"/>
+                            </p:stCondLst>
+                            <p:childTnLst>
+                              <p:par>
+                                <p:cTn id="56" presetID="22" presetClass="entr" presetSubtype="4" fill="hold" nodeType="clickEffect">
+                                  <p:stCondLst>
+                                    <p:cond delay="0"/>
+                                  </p:stCondLst>
+                                  <p:childTnLst>
+                                    <p:set>
+                                      <p:cBhvr>
+                                        <p:cTn id="57" dur="1" fill="hold">
+                                          <p:stCondLst>
+                                            <p:cond delay="0"/>
+                                          </p:stCondLst>
+                                        </p:cTn>
+                                        <p:tgtEl>
+                                          <p:spTgt spid="29"/>
+                                        </p:tgtEl>
+                                        <p:attrNameLst>
+                                          <p:attrName>style.visibility</p:attrName>
+                                        </p:attrNameLst>
+                                      </p:cBhvr>
+                                      <p:to>
+                                        <p:strVal val="visible"/>
+                                      </p:to>
+                                    </p:set>
+                                    <p:animEffect transition="in" filter="wipe(down)">
+                                      <p:cBhvr>
+                                        <p:cTn id="58" dur="500"/>
+                                        <p:tgtEl>
+                                          <p:spTgt spid="29"/>
+                                        </p:tgtEl>
+                                      </p:cBhvr>
+                                    </p:animEffect>
+                                  </p:childTnLst>
+                                </p:cTn>
+                              </p:par>
+                            </p:childTnLst>
+                          </p:cTn>
+                        </p:par>
+                      </p:childTnLst>
+                    </p:cTn>
+                  </p:par>
+                </p:childTnLst>
+              </p:cTn>
+              <p:prevCondLst>
+                <p:cond evt="onPrev" delay="0">
+                  <p:tgtEl>
+                    <p:sldTgt/>
+                  </p:tgtEl>
+                </p:cond>
+              </p:prevCondLst>
+              <p:nextCondLst>
+                <p:cond evt="onNext" delay="0">
+                  <p:tgtEl>
+                    <p:sldTgt/>
+                  </p:tgtEl>
+                </p:cond>
+              </p:nextCondLst>
+            </p:seq>
+          </p:childTnLst>
+        </p:cTn>
+      </p:par>
+    </p:tnLst>
+    <p:bldLst>
+      <p:bldP spid="14" grpId="0"/>
+      <p:bldP spid="18" grpId="0"/>
+      <p:bldP spid="23" grpId="0"/>
+      <p:bldP spid="25" grpId="0"/>
+      <p:bldP spid="26" grpId="0"/>
+      <p:bldP spid="28" grpId="0"/>
+    </p:bldLst>
+  </p:timing>
 </p:sld>
 </file>
 
@@ -6572,6 +7852,165 @@
           <a:chExt cx="0" cy="0"/>
         </a:xfrm>
       </p:grpSpPr>
+      <p:pic>
+        <p:nvPicPr>
+          <p:cNvPr id="5" name="Content Placeholder 4"/>
+          <p:cNvPicPr>
+            <a:picLocks noGrp="1" noChangeAspect="1"/>
+          </p:cNvPicPr>
+          <p:nvPr>
+            <p:ph sz="quarter" idx="13"/>
+          </p:nvPr>
+        </p:nvPicPr>
+        <p:blipFill>
+          <a:blip r:embed="rId2"/>
+          <a:stretch>
+            <a:fillRect/>
+          </a:stretch>
+        </p:blipFill>
+        <p:spPr>
+          <a:xfrm>
+            <a:off x="137233" y="221697"/>
+            <a:ext cx="11416678" cy="5198442"/>
+          </a:xfrm>
+        </p:spPr>
+      </p:pic>
+    </p:spTree>
+    <p:extLst>
+      <p:ext uri="{BB962C8B-B14F-4D97-AF65-F5344CB8AC3E}">
+        <p14:creationId xmlns:p14="http://schemas.microsoft.com/office/powerpoint/2010/main" val="1321433462"/>
+      </p:ext>
+    </p:extLst>
+  </p:cSld>
+  <p:clrMapOvr>
+    <a:masterClrMapping/>
+  </p:clrMapOvr>
+</p:sld>
+</file>
+
+<file path=ppt/slides/slide12.xml><?xml version="1.0" encoding="utf-8"?>
+<p:sld xmlns:a="http://schemas.openxmlformats.org/drawingml/2006/main" xmlns:r="http://schemas.openxmlformats.org/officeDocument/2006/relationships" xmlns:p="http://schemas.openxmlformats.org/presentationml/2006/main">
+  <p:cSld>
+    <p:spTree>
+      <p:nvGrpSpPr>
+        <p:cNvPr id="1" name=""/>
+        <p:cNvGrpSpPr/>
+        <p:nvPr/>
+      </p:nvGrpSpPr>
+      <p:grpSpPr>
+        <a:xfrm>
+          <a:off x="0" y="0"/>
+          <a:ext cx="0" cy="0"/>
+          <a:chOff x="0" y="0"/>
+          <a:chExt cx="0" cy="0"/>
+        </a:xfrm>
+      </p:grpSpPr>
+      <p:pic>
+        <p:nvPicPr>
+          <p:cNvPr id="7" name="Content Placeholder 6"/>
+          <p:cNvPicPr>
+            <a:picLocks noGrp="1" noChangeAspect="1"/>
+          </p:cNvPicPr>
+          <p:nvPr>
+            <p:ph sz="quarter" idx="13"/>
+          </p:nvPr>
+        </p:nvPicPr>
+        <p:blipFill>
+          <a:blip r:embed="rId2"/>
+          <a:stretch>
+            <a:fillRect/>
+          </a:stretch>
+        </p:blipFill>
+        <p:spPr>
+          <a:xfrm>
+            <a:off x="168614" y="218364"/>
+            <a:ext cx="11350096" cy="5254387"/>
+          </a:xfrm>
+        </p:spPr>
+      </p:pic>
+    </p:spTree>
+    <p:extLst>
+      <p:ext uri="{BB962C8B-B14F-4D97-AF65-F5344CB8AC3E}">
+        <p14:creationId xmlns:p14="http://schemas.microsoft.com/office/powerpoint/2010/main" val="214479819"/>
+      </p:ext>
+    </p:extLst>
+  </p:cSld>
+  <p:clrMapOvr>
+    <a:masterClrMapping/>
+  </p:clrMapOvr>
+</p:sld>
+</file>
+
+<file path=ppt/slides/slide13.xml><?xml version="1.0" encoding="utf-8"?>
+<p:sld xmlns:a="http://schemas.openxmlformats.org/drawingml/2006/main" xmlns:r="http://schemas.openxmlformats.org/officeDocument/2006/relationships" xmlns:p="http://schemas.openxmlformats.org/presentationml/2006/main">
+  <p:cSld>
+    <p:spTree>
+      <p:nvGrpSpPr>
+        <p:cNvPr id="1" name=""/>
+        <p:cNvGrpSpPr/>
+        <p:nvPr/>
+      </p:nvGrpSpPr>
+      <p:grpSpPr>
+        <a:xfrm>
+          <a:off x="0" y="0"/>
+          <a:ext cx="0" cy="0"/>
+          <a:chOff x="0" y="0"/>
+          <a:chExt cx="0" cy="0"/>
+        </a:xfrm>
+      </p:grpSpPr>
+      <p:pic>
+        <p:nvPicPr>
+          <p:cNvPr id="7" name="Content Placeholder 6"/>
+          <p:cNvPicPr>
+            <a:picLocks noGrp="1" noChangeAspect="1"/>
+          </p:cNvPicPr>
+          <p:nvPr>
+            <p:ph sz="quarter" idx="13"/>
+          </p:nvPr>
+        </p:nvPicPr>
+        <p:blipFill>
+          <a:blip r:embed="rId2"/>
+          <a:stretch>
+            <a:fillRect/>
+          </a:stretch>
+        </p:blipFill>
+        <p:spPr>
+          <a:xfrm>
+            <a:off x="123803" y="136478"/>
+            <a:ext cx="11408555" cy="5363569"/>
+          </a:xfrm>
+        </p:spPr>
+      </p:pic>
+    </p:spTree>
+    <p:extLst>
+      <p:ext uri="{BB962C8B-B14F-4D97-AF65-F5344CB8AC3E}">
+        <p14:creationId xmlns:p14="http://schemas.microsoft.com/office/powerpoint/2010/main" val="2671597126"/>
+      </p:ext>
+    </p:extLst>
+  </p:cSld>
+  <p:clrMapOvr>
+    <a:masterClrMapping/>
+  </p:clrMapOvr>
+</p:sld>
+</file>
+
+<file path=ppt/slides/slide14.xml><?xml version="1.0" encoding="utf-8"?>
+<p:sld xmlns:a="http://schemas.openxmlformats.org/drawingml/2006/main" xmlns:r="http://schemas.openxmlformats.org/officeDocument/2006/relationships" xmlns:p="http://schemas.openxmlformats.org/presentationml/2006/main">
+  <p:cSld>
+    <p:spTree>
+      <p:nvGrpSpPr>
+        <p:cNvPr id="1" name=""/>
+        <p:cNvGrpSpPr/>
+        <p:nvPr/>
+      </p:nvGrpSpPr>
+      <p:grpSpPr>
+        <a:xfrm>
+          <a:off x="0" y="0"/>
+          <a:ext cx="0" cy="0"/>
+          <a:chOff x="0" y="0"/>
+          <a:chExt cx="0" cy="0"/>
+        </a:xfrm>
+      </p:grpSpPr>
       <p:sp>
         <p:nvSpPr>
           <p:cNvPr id="2" name="Title 1"/>
@@ -6582,34 +8021,20 @@
             <p:ph type="title"/>
           </p:nvPr>
         </p:nvSpPr>
-        <p:spPr/>
+        <p:spPr>
+          <a:xfrm>
+            <a:off x="805071" y="2011018"/>
+            <a:ext cx="10396882" cy="1151965"/>
+          </a:xfrm>
+        </p:spPr>
         <p:txBody>
           <a:bodyPr/>
           <a:lstStyle/>
           <a:p>
             <a:r>
               <a:rPr lang="en-PH" dirty="0"/>
-              <a:t>Recommendation and conclusion</a:t>
-            </a:r>
-          </a:p>
-        </p:txBody>
-      </p:sp>
-      <p:sp>
-        <p:nvSpPr>
-          <p:cNvPr id="3" name="Content Placeholder 2"/>
-          <p:cNvSpPr>
-            <a:spLocks noGrp="1"/>
-          </p:cNvSpPr>
-          <p:nvPr>
-            <p:ph sz="quarter" idx="13"/>
-          </p:nvPr>
-        </p:nvSpPr>
-        <p:spPr/>
-        <p:txBody>
-          <a:bodyPr/>
-          <a:lstStyle/>
-          <a:p>
-            <a:endParaRPr lang="en-PH"/>
+              <a:t>conclusion</a:t>
+            </a:r>
           </a:p>
         </p:txBody>
       </p:sp>
@@ -6744,51 +8169,33 @@
           <a:chExt cx="0" cy="0"/>
         </a:xfrm>
       </p:grpSpPr>
-      <p:sp>
-        <p:nvSpPr>
-          <p:cNvPr id="2" name="Title 1"/>
-          <p:cNvSpPr>
-            <a:spLocks noGrp="1"/>
-          </p:cNvSpPr>
-          <p:nvPr>
-            <p:ph type="title"/>
-          </p:nvPr>
-        </p:nvSpPr>
-        <p:spPr/>
-        <p:txBody>
-          <a:bodyPr/>
-          <a:lstStyle/>
-          <a:p>
-            <a:r>
-              <a:rPr lang="en-PH" dirty="0"/>
-              <a:t>Population per region</a:t>
-            </a:r>
-          </a:p>
-        </p:txBody>
-      </p:sp>
-      <p:sp>
-        <p:nvSpPr>
-          <p:cNvPr id="3" name="Content Placeholder 2"/>
-          <p:cNvSpPr>
-            <a:spLocks noGrp="1"/>
-          </p:cNvSpPr>
+      <p:pic>
+        <p:nvPicPr>
+          <p:cNvPr id="5" name="Content Placeholder 4"/>
+          <p:cNvPicPr>
+            <a:picLocks noGrp="1" noChangeAspect="1"/>
+          </p:cNvPicPr>
           <p:nvPr>
             <p:ph sz="quarter" idx="13"/>
           </p:nvPr>
-        </p:nvSpPr>
-        <p:spPr/>
-        <p:txBody>
-          <a:bodyPr/>
-          <a:lstStyle/>
-          <a:p>
-            <a:endParaRPr lang="en-PH"/>
-          </a:p>
-        </p:txBody>
-      </p:sp>
+        </p:nvPicPr>
+        <p:blipFill>
+          <a:blip r:embed="rId2"/>
+          <a:stretch>
+            <a:fillRect/>
+          </a:stretch>
+        </p:blipFill>
+        <p:spPr>
+          <a:xfrm>
+            <a:off x="159026" y="319020"/>
+            <a:ext cx="11410122" cy="5210158"/>
+          </a:xfrm>
+        </p:spPr>
+      </p:pic>
     </p:spTree>
     <p:extLst>
       <p:ext uri="{BB962C8B-B14F-4D97-AF65-F5344CB8AC3E}">
-        <p14:creationId xmlns:p14="http://schemas.microsoft.com/office/powerpoint/2010/main" val="449203605"/>
+        <p14:creationId xmlns:p14="http://schemas.microsoft.com/office/powerpoint/2010/main" val="3011941836"/>
       </p:ext>
     </p:extLst>
   </p:cSld>
@@ -6815,51 +8222,33 @@
           <a:chExt cx="0" cy="0"/>
         </a:xfrm>
       </p:grpSpPr>
-      <p:sp>
-        <p:nvSpPr>
-          <p:cNvPr id="2" name="Title 1"/>
-          <p:cNvSpPr>
-            <a:spLocks noGrp="1"/>
-          </p:cNvSpPr>
-          <p:nvPr>
-            <p:ph type="title"/>
-          </p:nvPr>
-        </p:nvSpPr>
-        <p:spPr/>
-        <p:txBody>
-          <a:bodyPr/>
-          <a:lstStyle/>
-          <a:p>
-            <a:r>
-              <a:rPr lang="en-PH" dirty="0"/>
-              <a:t>Family per region</a:t>
-            </a:r>
-          </a:p>
-        </p:txBody>
-      </p:sp>
-      <p:sp>
-        <p:nvSpPr>
-          <p:cNvPr id="3" name="Content Placeholder 2"/>
-          <p:cNvSpPr>
-            <a:spLocks noGrp="1"/>
-          </p:cNvSpPr>
+      <p:pic>
+        <p:nvPicPr>
+          <p:cNvPr id="5" name="Content Placeholder 4"/>
+          <p:cNvPicPr>
+            <a:picLocks noGrp="1" noChangeAspect="1"/>
+          </p:cNvPicPr>
           <p:nvPr>
             <p:ph sz="quarter" idx="13"/>
           </p:nvPr>
-        </p:nvSpPr>
-        <p:spPr/>
-        <p:txBody>
-          <a:bodyPr/>
-          <a:lstStyle/>
-          <a:p>
-            <a:endParaRPr lang="en-PH"/>
-          </a:p>
-        </p:txBody>
-      </p:sp>
+        </p:nvPicPr>
+        <p:blipFill>
+          <a:blip r:embed="rId2"/>
+          <a:stretch>
+            <a:fillRect/>
+          </a:stretch>
+        </p:blipFill>
+        <p:spPr>
+          <a:xfrm>
+            <a:off x="127236" y="132522"/>
+            <a:ext cx="11468415" cy="5340626"/>
+          </a:xfrm>
+        </p:spPr>
+      </p:pic>
     </p:spTree>
     <p:extLst>
       <p:ext uri="{BB962C8B-B14F-4D97-AF65-F5344CB8AC3E}">
-        <p14:creationId xmlns:p14="http://schemas.microsoft.com/office/powerpoint/2010/main" val="2794373224"/>
+        <p14:creationId xmlns:p14="http://schemas.microsoft.com/office/powerpoint/2010/main" val="2042359546"/>
       </p:ext>
     </p:extLst>
   </p:cSld>
@@ -6886,51 +8275,33 @@
           <a:chExt cx="0" cy="0"/>
         </a:xfrm>
       </p:grpSpPr>
-      <p:sp>
-        <p:nvSpPr>
-          <p:cNvPr id="2" name="Title 1"/>
-          <p:cNvSpPr>
-            <a:spLocks noGrp="1"/>
-          </p:cNvSpPr>
-          <p:nvPr>
-            <p:ph type="title"/>
-          </p:nvPr>
-        </p:nvSpPr>
-        <p:spPr/>
-        <p:txBody>
-          <a:bodyPr/>
-          <a:lstStyle/>
-          <a:p>
-            <a:r>
-              <a:rPr lang="en-PH" dirty="0"/>
-              <a:t>Income of families per region</a:t>
-            </a:r>
-          </a:p>
-        </p:txBody>
-      </p:sp>
-      <p:sp>
-        <p:nvSpPr>
-          <p:cNvPr id="3" name="Content Placeholder 2"/>
-          <p:cNvSpPr>
-            <a:spLocks noGrp="1"/>
-          </p:cNvSpPr>
+      <p:pic>
+        <p:nvPicPr>
+          <p:cNvPr id="7" name="Content Placeholder 6"/>
+          <p:cNvPicPr>
+            <a:picLocks noGrp="1" noChangeAspect="1"/>
+          </p:cNvPicPr>
           <p:nvPr>
             <p:ph sz="quarter" idx="13"/>
           </p:nvPr>
-        </p:nvSpPr>
-        <p:spPr/>
-        <p:txBody>
-          <a:bodyPr/>
-          <a:lstStyle/>
-          <a:p>
-            <a:endParaRPr lang="en-PH"/>
-          </a:p>
-        </p:txBody>
-      </p:sp>
+        </p:nvPicPr>
+        <p:blipFill>
+          <a:blip r:embed="rId2"/>
+          <a:stretch>
+            <a:fillRect/>
+          </a:stretch>
+        </p:blipFill>
+        <p:spPr>
+          <a:xfrm>
+            <a:off x="110312" y="136477"/>
+            <a:ext cx="11422045" cy="5264552"/>
+          </a:xfrm>
+        </p:spPr>
+      </p:pic>
     </p:spTree>
     <p:extLst>
       <p:ext uri="{BB962C8B-B14F-4D97-AF65-F5344CB8AC3E}">
-        <p14:creationId xmlns:p14="http://schemas.microsoft.com/office/powerpoint/2010/main" val="3890627261"/>
+        <p14:creationId xmlns:p14="http://schemas.microsoft.com/office/powerpoint/2010/main" val="3706902878"/>
       </p:ext>
     </p:extLst>
   </p:cSld>
@@ -6957,51 +8328,33 @@
           <a:chExt cx="0" cy="0"/>
         </a:xfrm>
       </p:grpSpPr>
-      <p:sp>
-        <p:nvSpPr>
-          <p:cNvPr id="2" name="Title 1"/>
-          <p:cNvSpPr>
-            <a:spLocks noGrp="1"/>
-          </p:cNvSpPr>
-          <p:nvPr>
-            <p:ph type="title"/>
-          </p:nvPr>
-        </p:nvSpPr>
-        <p:spPr/>
-        <p:txBody>
-          <a:bodyPr/>
-          <a:lstStyle/>
-          <a:p>
-            <a:r>
-              <a:rPr lang="en-PH" dirty="0"/>
-              <a:t>Expenditure of families per region</a:t>
-            </a:r>
-          </a:p>
-        </p:txBody>
-      </p:sp>
-      <p:sp>
-        <p:nvSpPr>
-          <p:cNvPr id="3" name="Content Placeholder 2"/>
-          <p:cNvSpPr>
-            <a:spLocks noGrp="1"/>
-          </p:cNvSpPr>
+      <p:pic>
+        <p:nvPicPr>
+          <p:cNvPr id="7" name="Content Placeholder 6"/>
+          <p:cNvPicPr>
+            <a:picLocks noGrp="1" noChangeAspect="1"/>
+          </p:cNvPicPr>
           <p:nvPr>
             <p:ph sz="quarter" idx="13"/>
           </p:nvPr>
-        </p:nvSpPr>
-        <p:spPr/>
-        <p:txBody>
-          <a:bodyPr/>
-          <a:lstStyle/>
-          <a:p>
-            <a:endParaRPr lang="en-PH"/>
-          </a:p>
-        </p:txBody>
-      </p:sp>
+        </p:nvPicPr>
+        <p:blipFill>
+          <a:blip r:embed="rId2"/>
+          <a:stretch>
+            <a:fillRect/>
+          </a:stretch>
+        </p:blipFill>
+        <p:spPr>
+          <a:xfrm>
+            <a:off x="144783" y="193047"/>
+            <a:ext cx="11428518" cy="5211466"/>
+          </a:xfrm>
+        </p:spPr>
+      </p:pic>
     </p:spTree>
     <p:extLst>
       <p:ext uri="{BB962C8B-B14F-4D97-AF65-F5344CB8AC3E}">
-        <p14:creationId xmlns:p14="http://schemas.microsoft.com/office/powerpoint/2010/main" val="1837049131"/>
+        <p14:creationId xmlns:p14="http://schemas.microsoft.com/office/powerpoint/2010/main" val="3890627261"/>
       </p:ext>
     </p:extLst>
   </p:cSld>
@@ -7028,53 +8381,33 @@
           <a:chExt cx="0" cy="0"/>
         </a:xfrm>
       </p:grpSpPr>
-      <p:sp>
-        <p:nvSpPr>
-          <p:cNvPr id="2" name="Title 1"/>
-          <p:cNvSpPr>
-            <a:spLocks noGrp="1"/>
-          </p:cNvSpPr>
-          <p:nvPr>
-            <p:ph type="title"/>
-          </p:nvPr>
-        </p:nvSpPr>
-        <p:spPr/>
-        <p:txBody>
-          <a:bodyPr>
-            <a:normAutofit fontScale="90000"/>
-          </a:bodyPr>
-          <a:lstStyle/>
-          <a:p>
-            <a:r>
-              <a:rPr lang="en-PH" dirty="0"/>
-              <a:t>Annual poverty threshold by population</a:t>
-            </a:r>
-          </a:p>
-        </p:txBody>
-      </p:sp>
-      <p:sp>
-        <p:nvSpPr>
-          <p:cNvPr id="3" name="Content Placeholder 2"/>
-          <p:cNvSpPr>
-            <a:spLocks noGrp="1"/>
-          </p:cNvSpPr>
+      <p:pic>
+        <p:nvPicPr>
+          <p:cNvPr id="7" name="Content Placeholder 6"/>
+          <p:cNvPicPr>
+            <a:picLocks noGrp="1" noChangeAspect="1"/>
+          </p:cNvPicPr>
           <p:nvPr>
             <p:ph sz="quarter" idx="13"/>
           </p:nvPr>
-        </p:nvSpPr>
-        <p:spPr/>
-        <p:txBody>
-          <a:bodyPr/>
-          <a:lstStyle/>
-          <a:p>
-            <a:endParaRPr lang="en-PH"/>
-          </a:p>
-        </p:txBody>
-      </p:sp>
+        </p:nvPicPr>
+        <p:blipFill>
+          <a:blip r:embed="rId2"/>
+          <a:stretch>
+            <a:fillRect/>
+          </a:stretch>
+        </p:blipFill>
+        <p:spPr>
+          <a:xfrm>
+            <a:off x="116676" y="145774"/>
+            <a:ext cx="11439219" cy="5322367"/>
+          </a:xfrm>
+        </p:spPr>
+      </p:pic>
     </p:spTree>
     <p:extLst>
       <p:ext uri="{BB962C8B-B14F-4D97-AF65-F5344CB8AC3E}">
-        <p14:creationId xmlns:p14="http://schemas.microsoft.com/office/powerpoint/2010/main" val="2324023629"/>
+        <p14:creationId xmlns:p14="http://schemas.microsoft.com/office/powerpoint/2010/main" val="1837049131"/>
       </p:ext>
     </p:extLst>
   </p:cSld>
@@ -7101,51 +8434,33 @@
           <a:chExt cx="0" cy="0"/>
         </a:xfrm>
       </p:grpSpPr>
-      <p:sp>
-        <p:nvSpPr>
-          <p:cNvPr id="2" name="Title 1"/>
-          <p:cNvSpPr>
-            <a:spLocks noGrp="1"/>
-          </p:cNvSpPr>
-          <p:nvPr>
-            <p:ph type="title"/>
-          </p:nvPr>
-        </p:nvSpPr>
-        <p:spPr/>
-        <p:txBody>
-          <a:bodyPr/>
-          <a:lstStyle/>
-          <a:p>
-            <a:r>
-              <a:rPr lang="en-PH" dirty="0"/>
-              <a:t>Poverty incidence by population</a:t>
-            </a:r>
-          </a:p>
-        </p:txBody>
-      </p:sp>
-      <p:sp>
-        <p:nvSpPr>
-          <p:cNvPr id="3" name="Content Placeholder 2"/>
-          <p:cNvSpPr>
-            <a:spLocks noGrp="1"/>
-          </p:cNvSpPr>
+      <p:pic>
+        <p:nvPicPr>
+          <p:cNvPr id="7" name="Content Placeholder 6"/>
+          <p:cNvPicPr>
+            <a:picLocks noGrp="1" noChangeAspect="1"/>
+          </p:cNvPicPr>
           <p:nvPr>
             <p:ph sz="quarter" idx="13"/>
           </p:nvPr>
-        </p:nvSpPr>
-        <p:spPr/>
-        <p:txBody>
-          <a:bodyPr/>
-          <a:lstStyle/>
-          <a:p>
-            <a:endParaRPr lang="en-PH" dirty="0"/>
-          </a:p>
-        </p:txBody>
-      </p:sp>
+        </p:nvPicPr>
+        <p:blipFill>
+          <a:blip r:embed="rId2"/>
+          <a:stretch>
+            <a:fillRect/>
+          </a:stretch>
+        </p:blipFill>
+        <p:spPr>
+          <a:xfrm>
+            <a:off x="144728" y="177421"/>
+            <a:ext cx="11483165" cy="5227092"/>
+          </a:xfrm>
+        </p:spPr>
+      </p:pic>
     </p:spTree>
     <p:extLst>
       <p:ext uri="{BB962C8B-B14F-4D97-AF65-F5344CB8AC3E}">
-        <p14:creationId xmlns:p14="http://schemas.microsoft.com/office/powerpoint/2010/main" val="1321433462"/>
+        <p14:creationId xmlns:p14="http://schemas.microsoft.com/office/powerpoint/2010/main" val="2324023629"/>
       </p:ext>
     </p:extLst>
   </p:cSld>
@@ -7172,51 +8487,946 @@
           <a:chExt cx="0" cy="0"/>
         </a:xfrm>
       </p:grpSpPr>
-      <p:sp>
-        <p:nvSpPr>
-          <p:cNvPr id="2" name="Title 1"/>
-          <p:cNvSpPr>
-            <a:spLocks noGrp="1"/>
-          </p:cNvSpPr>
-          <p:nvPr>
-            <p:ph type="title"/>
-          </p:nvPr>
-        </p:nvSpPr>
-        <p:spPr/>
-        <p:txBody>
-          <a:bodyPr/>
-          <a:lstStyle/>
-          <a:p>
-            <a:r>
-              <a:rPr lang="en-PH" dirty="0"/>
-              <a:t>Labor productivity by population</a:t>
-            </a:r>
-          </a:p>
-        </p:txBody>
-      </p:sp>
-      <p:sp>
-        <p:nvSpPr>
-          <p:cNvPr id="3" name="Content Placeholder 2"/>
-          <p:cNvSpPr>
-            <a:spLocks noGrp="1"/>
-          </p:cNvSpPr>
+      <p:graphicFrame>
+        <p:nvGraphicFramePr>
+          <p:cNvPr id="4" name="Content Placeholder 3"/>
+          <p:cNvGraphicFramePr>
+            <a:graphicFrameLocks noGrp="1"/>
+          </p:cNvGraphicFramePr>
           <p:nvPr>
             <p:ph sz="quarter" idx="13"/>
-          </p:nvPr>
-        </p:nvSpPr>
-        <p:spPr/>
-        <p:txBody>
-          <a:bodyPr/>
-          <a:lstStyle/>
-          <a:p>
-            <a:endParaRPr lang="en-PH"/>
-          </a:p>
-        </p:txBody>
-      </p:sp>
+            <p:extLst>
+              <p:ext uri="{D42A27DB-BD31-4B8C-83A1-F6EECF244321}">
+                <p14:modId xmlns:p14="http://schemas.microsoft.com/office/powerpoint/2010/main" val="1026550201"/>
+              </p:ext>
+            </p:extLst>
+          </p:nvPr>
+        </p:nvGraphicFramePr>
+        <p:xfrm>
+          <a:off x="530087" y="503583"/>
+          <a:ext cx="10495722" cy="4666624"/>
+        </p:xfrm>
+        <a:graphic>
+          <a:graphicData uri="http://schemas.openxmlformats.org/drawingml/2006/table">
+            <a:tbl>
+              <a:tblPr firstRow="1" firstCol="1" bandRow="1">
+                <a:tableStyleId>{3B4B98B0-60AC-42C2-AFA5-B58CD77FA1E5}</a:tableStyleId>
+              </a:tblPr>
+              <a:tblGrid>
+                <a:gridCol w="3497826">
+                  <a:extLst>
+                    <a:ext uri="{9D8B030D-6E8A-4147-A177-3AD203B41FA5}">
+                      <a16:colId xmlns:a16="http://schemas.microsoft.com/office/drawing/2014/main" val="722259368"/>
+                    </a:ext>
+                  </a:extLst>
+                </a:gridCol>
+                <a:gridCol w="3498948">
+                  <a:extLst>
+                    <a:ext uri="{9D8B030D-6E8A-4147-A177-3AD203B41FA5}">
+                      <a16:colId xmlns:a16="http://schemas.microsoft.com/office/drawing/2014/main" val="872648020"/>
+                    </a:ext>
+                  </a:extLst>
+                </a:gridCol>
+                <a:gridCol w="3498948">
+                  <a:extLst>
+                    <a:ext uri="{9D8B030D-6E8A-4147-A177-3AD203B41FA5}">
+                      <a16:colId xmlns:a16="http://schemas.microsoft.com/office/drawing/2014/main" val="4132970876"/>
+                    </a:ext>
+                  </a:extLst>
+                </a:gridCol>
+              </a:tblGrid>
+              <a:tr h="503183">
+                <a:tc>
+                  <a:txBody>
+                    <a:bodyPr/>
+                    <a:lstStyle/>
+                    <a:p>
+                      <a:pPr algn="ctr">
+                        <a:lnSpc>
+                          <a:spcPct val="150000"/>
+                        </a:lnSpc>
+                        <a:spcAft>
+                          <a:spcPts val="0"/>
+                        </a:spcAft>
+                      </a:pPr>
+                      <a:r>
+                        <a:rPr lang="en-PH" sz="2400" dirty="0">
+                          <a:effectLst/>
+                          <a:latin typeface="Arial" panose="020B0604020202020204" pitchFamily="34" charset="0"/>
+                          <a:cs typeface="Arial" panose="020B0604020202020204" pitchFamily="34" charset="0"/>
+                        </a:rPr>
+                        <a:t>Family Members</a:t>
+                      </a:r>
+                      <a:endParaRPr lang="en-PH" sz="2000" b="0" dirty="0">
+                        <a:effectLst/>
+                        <a:latin typeface="Arial" panose="020B0604020202020204" pitchFamily="34" charset="0"/>
+                        <a:ea typeface="Calibri" panose="020F0502020204030204" pitchFamily="34" charset="0"/>
+                        <a:cs typeface="Arial" panose="020B0604020202020204" pitchFamily="34" charset="0"/>
+                      </a:endParaRPr>
+                    </a:p>
+                  </a:txBody>
+                  <a:tcPr marL="68580" marR="68580" marT="0" marB="0"/>
+                </a:tc>
+                <a:tc>
+                  <a:txBody>
+                    <a:bodyPr/>
+                    <a:lstStyle/>
+                    <a:p>
+                      <a:pPr algn="ctr">
+                        <a:lnSpc>
+                          <a:spcPct val="150000"/>
+                        </a:lnSpc>
+                        <a:spcAft>
+                          <a:spcPts val="0"/>
+                        </a:spcAft>
+                      </a:pPr>
+                      <a:r>
+                        <a:rPr lang="en-PH" sz="2400">
+                          <a:effectLst/>
+                          <a:latin typeface="Arial" panose="020B0604020202020204" pitchFamily="34" charset="0"/>
+                          <a:cs typeface="Arial" panose="020B0604020202020204" pitchFamily="34" charset="0"/>
+                        </a:rPr>
+                        <a:t>Occupation</a:t>
+                      </a:r>
+                      <a:endParaRPr lang="en-PH" sz="2000" b="0">
+                        <a:effectLst/>
+                        <a:latin typeface="Arial" panose="020B0604020202020204" pitchFamily="34" charset="0"/>
+                        <a:ea typeface="Calibri" panose="020F0502020204030204" pitchFamily="34" charset="0"/>
+                        <a:cs typeface="Arial" panose="020B0604020202020204" pitchFamily="34" charset="0"/>
+                      </a:endParaRPr>
+                    </a:p>
+                  </a:txBody>
+                  <a:tcPr marL="68580" marR="68580" marT="0" marB="0"/>
+                </a:tc>
+                <a:tc>
+                  <a:txBody>
+                    <a:bodyPr/>
+                    <a:lstStyle/>
+                    <a:p>
+                      <a:pPr algn="ctr">
+                        <a:lnSpc>
+                          <a:spcPct val="150000"/>
+                        </a:lnSpc>
+                        <a:spcAft>
+                          <a:spcPts val="0"/>
+                        </a:spcAft>
+                      </a:pPr>
+                      <a:r>
+                        <a:rPr lang="en-PH" sz="2400">
+                          <a:effectLst/>
+                          <a:latin typeface="Arial" panose="020B0604020202020204" pitchFamily="34" charset="0"/>
+                          <a:cs typeface="Arial" panose="020B0604020202020204" pitchFamily="34" charset="0"/>
+                        </a:rPr>
+                        <a:t>Annual Income</a:t>
+                      </a:r>
+                      <a:endParaRPr lang="en-PH" sz="2000" b="0">
+                        <a:effectLst/>
+                        <a:latin typeface="Arial" panose="020B0604020202020204" pitchFamily="34" charset="0"/>
+                        <a:ea typeface="Calibri" panose="020F0502020204030204" pitchFamily="34" charset="0"/>
+                        <a:cs typeface="Arial" panose="020B0604020202020204" pitchFamily="34" charset="0"/>
+                      </a:endParaRPr>
+                    </a:p>
+                  </a:txBody>
+                  <a:tcPr marL="68580" marR="68580" marT="0" marB="0"/>
+                </a:tc>
+                <a:extLst>
+                  <a:ext uri="{0D108BD9-81ED-4DB2-BD59-A6C34878D82A}">
+                    <a16:rowId xmlns:a16="http://schemas.microsoft.com/office/drawing/2014/main" val="586403665"/>
+                  </a:ext>
+                </a:extLst>
+              </a:tr>
+              <a:tr h="503183">
+                <a:tc>
+                  <a:txBody>
+                    <a:bodyPr/>
+                    <a:lstStyle/>
+                    <a:p>
+                      <a:pPr algn="just">
+                        <a:lnSpc>
+                          <a:spcPct val="150000"/>
+                        </a:lnSpc>
+                        <a:spcAft>
+                          <a:spcPts val="0"/>
+                        </a:spcAft>
+                      </a:pPr>
+                      <a:r>
+                        <a:rPr lang="en-PH" sz="2400" dirty="0">
+                          <a:effectLst/>
+                          <a:latin typeface="Arial" panose="020B0604020202020204" pitchFamily="34" charset="0"/>
+                          <a:cs typeface="Arial" panose="020B0604020202020204" pitchFamily="34" charset="0"/>
+                        </a:rPr>
+                        <a:t>Father</a:t>
+                      </a:r>
+                      <a:endParaRPr lang="en-PH" sz="2000" b="0" dirty="0">
+                        <a:effectLst/>
+                        <a:latin typeface="Arial" panose="020B0604020202020204" pitchFamily="34" charset="0"/>
+                        <a:ea typeface="Calibri" panose="020F0502020204030204" pitchFamily="34" charset="0"/>
+                        <a:cs typeface="Arial" panose="020B0604020202020204" pitchFamily="34" charset="0"/>
+                      </a:endParaRPr>
+                    </a:p>
+                  </a:txBody>
+                  <a:tcPr marL="68580" marR="68580" marT="0" marB="0"/>
+                </a:tc>
+                <a:tc>
+                  <a:txBody>
+                    <a:bodyPr/>
+                    <a:lstStyle/>
+                    <a:p>
+                      <a:pPr algn="just">
+                        <a:lnSpc>
+                          <a:spcPct val="150000"/>
+                        </a:lnSpc>
+                        <a:spcAft>
+                          <a:spcPts val="0"/>
+                        </a:spcAft>
+                      </a:pPr>
+                      <a:r>
+                        <a:rPr lang="en-PH" sz="2400">
+                          <a:effectLst/>
+                          <a:latin typeface="Arial" panose="020B0604020202020204" pitchFamily="34" charset="0"/>
+                          <a:cs typeface="Arial" panose="020B0604020202020204" pitchFamily="34" charset="0"/>
+                        </a:rPr>
+                        <a:t>Farmer</a:t>
+                      </a:r>
+                      <a:endParaRPr lang="en-PH" sz="2000" b="0">
+                        <a:effectLst/>
+                        <a:latin typeface="Arial" panose="020B0604020202020204" pitchFamily="34" charset="0"/>
+                        <a:ea typeface="Calibri" panose="020F0502020204030204" pitchFamily="34" charset="0"/>
+                        <a:cs typeface="Arial" panose="020B0604020202020204" pitchFamily="34" charset="0"/>
+                      </a:endParaRPr>
+                    </a:p>
+                  </a:txBody>
+                  <a:tcPr marL="68580" marR="68580" marT="0" marB="0"/>
+                </a:tc>
+                <a:tc>
+                  <a:txBody>
+                    <a:bodyPr/>
+                    <a:lstStyle/>
+                    <a:p>
+                      <a:pPr algn="just">
+                        <a:lnSpc>
+                          <a:spcPct val="150000"/>
+                        </a:lnSpc>
+                        <a:spcAft>
+                          <a:spcPts val="0"/>
+                        </a:spcAft>
+                      </a:pPr>
+                      <a:r>
+                        <a:rPr lang="en-PH" sz="2400">
+                          <a:effectLst/>
+                          <a:latin typeface="Arial" panose="020B0604020202020204" pitchFamily="34" charset="0"/>
+                          <a:cs typeface="Arial" panose="020B0604020202020204" pitchFamily="34" charset="0"/>
+                        </a:rPr>
+                        <a:t>₱   15, 000.00</a:t>
+                      </a:r>
+                      <a:endParaRPr lang="en-PH" sz="2000" b="0">
+                        <a:effectLst/>
+                        <a:latin typeface="Arial" panose="020B0604020202020204" pitchFamily="34" charset="0"/>
+                        <a:ea typeface="Calibri" panose="020F0502020204030204" pitchFamily="34" charset="0"/>
+                        <a:cs typeface="Arial" panose="020B0604020202020204" pitchFamily="34" charset="0"/>
+                      </a:endParaRPr>
+                    </a:p>
+                  </a:txBody>
+                  <a:tcPr marL="68580" marR="68580" marT="0" marB="0"/>
+                </a:tc>
+                <a:extLst>
+                  <a:ext uri="{0D108BD9-81ED-4DB2-BD59-A6C34878D82A}">
+                    <a16:rowId xmlns:a16="http://schemas.microsoft.com/office/drawing/2014/main" val="510427620"/>
+                  </a:ext>
+                </a:extLst>
+              </a:tr>
+              <a:tr h="503183">
+                <a:tc>
+                  <a:txBody>
+                    <a:bodyPr/>
+                    <a:lstStyle/>
+                    <a:p>
+                      <a:pPr algn="just">
+                        <a:lnSpc>
+                          <a:spcPct val="150000"/>
+                        </a:lnSpc>
+                        <a:spcAft>
+                          <a:spcPts val="0"/>
+                        </a:spcAft>
+                      </a:pPr>
+                      <a:r>
+                        <a:rPr lang="en-PH" sz="2400" dirty="0">
+                          <a:effectLst/>
+                          <a:latin typeface="Arial" panose="020B0604020202020204" pitchFamily="34" charset="0"/>
+                          <a:cs typeface="Arial" panose="020B0604020202020204" pitchFamily="34" charset="0"/>
+                        </a:rPr>
+                        <a:t>Mother</a:t>
+                      </a:r>
+                      <a:endParaRPr lang="en-PH" sz="2000" b="0" dirty="0">
+                        <a:effectLst/>
+                        <a:latin typeface="Arial" panose="020B0604020202020204" pitchFamily="34" charset="0"/>
+                        <a:ea typeface="Calibri" panose="020F0502020204030204" pitchFamily="34" charset="0"/>
+                        <a:cs typeface="Arial" panose="020B0604020202020204" pitchFamily="34" charset="0"/>
+                      </a:endParaRPr>
+                    </a:p>
+                  </a:txBody>
+                  <a:tcPr marL="68580" marR="68580" marT="0" marB="0"/>
+                </a:tc>
+                <a:tc>
+                  <a:txBody>
+                    <a:bodyPr/>
+                    <a:lstStyle/>
+                    <a:p>
+                      <a:pPr algn="just">
+                        <a:lnSpc>
+                          <a:spcPct val="150000"/>
+                        </a:lnSpc>
+                        <a:spcAft>
+                          <a:spcPts val="0"/>
+                        </a:spcAft>
+                      </a:pPr>
+                      <a:r>
+                        <a:rPr lang="en-PH" sz="2400">
+                          <a:effectLst/>
+                          <a:latin typeface="Arial" panose="020B0604020202020204" pitchFamily="34" charset="0"/>
+                          <a:cs typeface="Arial" panose="020B0604020202020204" pitchFamily="34" charset="0"/>
+                        </a:rPr>
+                        <a:t>Housewife</a:t>
+                      </a:r>
+                      <a:endParaRPr lang="en-PH" sz="2000" b="0">
+                        <a:effectLst/>
+                        <a:latin typeface="Arial" panose="020B0604020202020204" pitchFamily="34" charset="0"/>
+                        <a:ea typeface="Calibri" panose="020F0502020204030204" pitchFamily="34" charset="0"/>
+                        <a:cs typeface="Arial" panose="020B0604020202020204" pitchFamily="34" charset="0"/>
+                      </a:endParaRPr>
+                    </a:p>
+                  </a:txBody>
+                  <a:tcPr marL="68580" marR="68580" marT="0" marB="0"/>
+                </a:tc>
+                <a:tc>
+                  <a:txBody>
+                    <a:bodyPr/>
+                    <a:lstStyle/>
+                    <a:p>
+                      <a:pPr algn="just">
+                        <a:lnSpc>
+                          <a:spcPct val="150000"/>
+                        </a:lnSpc>
+                        <a:spcAft>
+                          <a:spcPts val="0"/>
+                        </a:spcAft>
+                      </a:pPr>
+                      <a:r>
+                        <a:rPr lang="en-PH" sz="2400">
+                          <a:effectLst/>
+                          <a:latin typeface="Arial" panose="020B0604020202020204" pitchFamily="34" charset="0"/>
+                          <a:cs typeface="Arial" panose="020B0604020202020204" pitchFamily="34" charset="0"/>
+                        </a:rPr>
+                        <a:t>-</a:t>
+                      </a:r>
+                      <a:endParaRPr lang="en-PH" sz="2000" b="0">
+                        <a:effectLst/>
+                        <a:latin typeface="Arial" panose="020B0604020202020204" pitchFamily="34" charset="0"/>
+                        <a:ea typeface="Calibri" panose="020F0502020204030204" pitchFamily="34" charset="0"/>
+                        <a:cs typeface="Arial" panose="020B0604020202020204" pitchFamily="34" charset="0"/>
+                      </a:endParaRPr>
+                    </a:p>
+                  </a:txBody>
+                  <a:tcPr marL="68580" marR="68580" marT="0" marB="0"/>
+                </a:tc>
+                <a:extLst>
+                  <a:ext uri="{0D108BD9-81ED-4DB2-BD59-A6C34878D82A}">
+                    <a16:rowId xmlns:a16="http://schemas.microsoft.com/office/drawing/2014/main" val="2430633710"/>
+                  </a:ext>
+                </a:extLst>
+              </a:tr>
+              <a:tr h="503183">
+                <a:tc>
+                  <a:txBody>
+                    <a:bodyPr/>
+                    <a:lstStyle/>
+                    <a:p>
+                      <a:pPr algn="just">
+                        <a:lnSpc>
+                          <a:spcPct val="150000"/>
+                        </a:lnSpc>
+                        <a:spcAft>
+                          <a:spcPts val="0"/>
+                        </a:spcAft>
+                      </a:pPr>
+                      <a:r>
+                        <a:rPr lang="en-PH" sz="2400" dirty="0">
+                          <a:effectLst/>
+                          <a:latin typeface="Arial" panose="020B0604020202020204" pitchFamily="34" charset="0"/>
+                          <a:cs typeface="Arial" panose="020B0604020202020204" pitchFamily="34" charset="0"/>
+                        </a:rPr>
+                        <a:t>Daughter A</a:t>
+                      </a:r>
+                      <a:endParaRPr lang="en-PH" sz="2000" b="0" dirty="0">
+                        <a:effectLst/>
+                        <a:latin typeface="Arial" panose="020B0604020202020204" pitchFamily="34" charset="0"/>
+                        <a:ea typeface="Calibri" panose="020F0502020204030204" pitchFamily="34" charset="0"/>
+                        <a:cs typeface="Arial" panose="020B0604020202020204" pitchFamily="34" charset="0"/>
+                      </a:endParaRPr>
+                    </a:p>
+                  </a:txBody>
+                  <a:tcPr marL="68580" marR="68580" marT="0" marB="0"/>
+                </a:tc>
+                <a:tc>
+                  <a:txBody>
+                    <a:bodyPr/>
+                    <a:lstStyle/>
+                    <a:p>
+                      <a:pPr algn="just">
+                        <a:lnSpc>
+                          <a:spcPct val="150000"/>
+                        </a:lnSpc>
+                        <a:spcAft>
+                          <a:spcPts val="0"/>
+                        </a:spcAft>
+                      </a:pPr>
+                      <a:r>
+                        <a:rPr lang="en-PH" sz="2400">
+                          <a:effectLst/>
+                          <a:latin typeface="Arial" panose="020B0604020202020204" pitchFamily="34" charset="0"/>
+                          <a:cs typeface="Arial" panose="020B0604020202020204" pitchFamily="34" charset="0"/>
+                        </a:rPr>
+                        <a:t>Maid</a:t>
+                      </a:r>
+                      <a:endParaRPr lang="en-PH" sz="2000" b="0">
+                        <a:effectLst/>
+                        <a:latin typeface="Arial" panose="020B0604020202020204" pitchFamily="34" charset="0"/>
+                        <a:ea typeface="Calibri" panose="020F0502020204030204" pitchFamily="34" charset="0"/>
+                        <a:cs typeface="Arial" panose="020B0604020202020204" pitchFamily="34" charset="0"/>
+                      </a:endParaRPr>
+                    </a:p>
+                  </a:txBody>
+                  <a:tcPr marL="68580" marR="68580" marT="0" marB="0"/>
+                </a:tc>
+                <a:tc>
+                  <a:txBody>
+                    <a:bodyPr/>
+                    <a:lstStyle/>
+                    <a:p>
+                      <a:pPr marL="342900" lvl="0" indent="-342900" algn="just">
+                        <a:lnSpc>
+                          <a:spcPct val="150000"/>
+                        </a:lnSpc>
+                        <a:spcAft>
+                          <a:spcPts val="0"/>
+                        </a:spcAft>
+                        <a:buFont typeface="Arial" panose="020B0604020202020204" pitchFamily="34" charset="0"/>
+                        <a:buChar char="₱"/>
+                      </a:pPr>
+                      <a:r>
+                        <a:rPr lang="en-PH" sz="2400">
+                          <a:effectLst/>
+                          <a:latin typeface="Arial" panose="020B0604020202020204" pitchFamily="34" charset="0"/>
+                          <a:cs typeface="Arial" panose="020B0604020202020204" pitchFamily="34" charset="0"/>
+                        </a:rPr>
+                        <a:t>18, 000.00</a:t>
+                      </a:r>
+                      <a:endParaRPr lang="en-PH" sz="2000" b="0">
+                        <a:effectLst/>
+                        <a:latin typeface="Arial" panose="020B0604020202020204" pitchFamily="34" charset="0"/>
+                        <a:ea typeface="Calibri" panose="020F0502020204030204" pitchFamily="34" charset="0"/>
+                        <a:cs typeface="Arial" panose="020B0604020202020204" pitchFamily="34" charset="0"/>
+                      </a:endParaRPr>
+                    </a:p>
+                  </a:txBody>
+                  <a:tcPr marL="68580" marR="68580" marT="0" marB="0"/>
+                </a:tc>
+                <a:extLst>
+                  <a:ext uri="{0D108BD9-81ED-4DB2-BD59-A6C34878D82A}">
+                    <a16:rowId xmlns:a16="http://schemas.microsoft.com/office/drawing/2014/main" val="241383603"/>
+                  </a:ext>
+                </a:extLst>
+              </a:tr>
+              <a:tr h="503183">
+                <a:tc>
+                  <a:txBody>
+                    <a:bodyPr/>
+                    <a:lstStyle/>
+                    <a:p>
+                      <a:pPr algn="just">
+                        <a:lnSpc>
+                          <a:spcPct val="150000"/>
+                        </a:lnSpc>
+                        <a:spcAft>
+                          <a:spcPts val="0"/>
+                        </a:spcAft>
+                      </a:pPr>
+                      <a:r>
+                        <a:rPr lang="en-PH" sz="2400">
+                          <a:effectLst/>
+                          <a:latin typeface="Arial" panose="020B0604020202020204" pitchFamily="34" charset="0"/>
+                          <a:cs typeface="Arial" panose="020B0604020202020204" pitchFamily="34" charset="0"/>
+                        </a:rPr>
+                        <a:t>Son A</a:t>
+                      </a:r>
+                      <a:endParaRPr lang="en-PH" sz="2000" b="0">
+                        <a:effectLst/>
+                        <a:latin typeface="Arial" panose="020B0604020202020204" pitchFamily="34" charset="0"/>
+                        <a:ea typeface="Calibri" panose="020F0502020204030204" pitchFamily="34" charset="0"/>
+                        <a:cs typeface="Arial" panose="020B0604020202020204" pitchFamily="34" charset="0"/>
+                      </a:endParaRPr>
+                    </a:p>
+                  </a:txBody>
+                  <a:tcPr marL="68580" marR="68580" marT="0" marB="0"/>
+                </a:tc>
+                <a:tc>
+                  <a:txBody>
+                    <a:bodyPr/>
+                    <a:lstStyle/>
+                    <a:p>
+                      <a:pPr algn="just">
+                        <a:lnSpc>
+                          <a:spcPct val="150000"/>
+                        </a:lnSpc>
+                        <a:spcAft>
+                          <a:spcPts val="0"/>
+                        </a:spcAft>
+                      </a:pPr>
+                      <a:r>
+                        <a:rPr lang="en-PH" sz="2400">
+                          <a:effectLst/>
+                          <a:latin typeface="Arial" panose="020B0604020202020204" pitchFamily="34" charset="0"/>
+                          <a:cs typeface="Arial" panose="020B0604020202020204" pitchFamily="34" charset="0"/>
+                        </a:rPr>
+                        <a:t>Laborer</a:t>
+                      </a:r>
+                      <a:endParaRPr lang="en-PH" sz="2000" b="0">
+                        <a:effectLst/>
+                        <a:latin typeface="Arial" panose="020B0604020202020204" pitchFamily="34" charset="0"/>
+                        <a:ea typeface="Calibri" panose="020F0502020204030204" pitchFamily="34" charset="0"/>
+                        <a:cs typeface="Arial" panose="020B0604020202020204" pitchFamily="34" charset="0"/>
+                      </a:endParaRPr>
+                    </a:p>
+                  </a:txBody>
+                  <a:tcPr marL="68580" marR="68580" marT="0" marB="0"/>
+                </a:tc>
+                <a:tc>
+                  <a:txBody>
+                    <a:bodyPr/>
+                    <a:lstStyle/>
+                    <a:p>
+                      <a:pPr algn="just">
+                        <a:lnSpc>
+                          <a:spcPct val="150000"/>
+                        </a:lnSpc>
+                        <a:spcAft>
+                          <a:spcPts val="0"/>
+                        </a:spcAft>
+                      </a:pPr>
+                      <a:r>
+                        <a:rPr lang="en-PH" sz="2400">
+                          <a:effectLst/>
+                          <a:latin typeface="Arial" panose="020B0604020202020204" pitchFamily="34" charset="0"/>
+                          <a:cs typeface="Arial" panose="020B0604020202020204" pitchFamily="34" charset="0"/>
+                        </a:rPr>
+                        <a:t>₱   36, 000.00 </a:t>
+                      </a:r>
+                      <a:endParaRPr lang="en-PH" sz="2000" b="0">
+                        <a:effectLst/>
+                        <a:latin typeface="Arial" panose="020B0604020202020204" pitchFamily="34" charset="0"/>
+                        <a:ea typeface="Calibri" panose="020F0502020204030204" pitchFamily="34" charset="0"/>
+                        <a:cs typeface="Arial" panose="020B0604020202020204" pitchFamily="34" charset="0"/>
+                      </a:endParaRPr>
+                    </a:p>
+                  </a:txBody>
+                  <a:tcPr marL="68580" marR="68580" marT="0" marB="0"/>
+                </a:tc>
+                <a:extLst>
+                  <a:ext uri="{0D108BD9-81ED-4DB2-BD59-A6C34878D82A}">
+                    <a16:rowId xmlns:a16="http://schemas.microsoft.com/office/drawing/2014/main" val="3590658835"/>
+                  </a:ext>
+                </a:extLst>
+              </a:tr>
+              <a:tr h="503183">
+                <a:tc>
+                  <a:txBody>
+                    <a:bodyPr/>
+                    <a:lstStyle/>
+                    <a:p>
+                      <a:pPr algn="just">
+                        <a:lnSpc>
+                          <a:spcPct val="150000"/>
+                        </a:lnSpc>
+                        <a:spcAft>
+                          <a:spcPts val="0"/>
+                        </a:spcAft>
+                      </a:pPr>
+                      <a:r>
+                        <a:rPr lang="en-PH" sz="2400">
+                          <a:effectLst/>
+                          <a:latin typeface="Arial" panose="020B0604020202020204" pitchFamily="34" charset="0"/>
+                          <a:cs typeface="Arial" panose="020B0604020202020204" pitchFamily="34" charset="0"/>
+                        </a:rPr>
+                        <a:t>Son B</a:t>
+                      </a:r>
+                      <a:endParaRPr lang="en-PH" sz="2000" b="0">
+                        <a:effectLst/>
+                        <a:latin typeface="Arial" panose="020B0604020202020204" pitchFamily="34" charset="0"/>
+                        <a:ea typeface="Calibri" panose="020F0502020204030204" pitchFamily="34" charset="0"/>
+                        <a:cs typeface="Arial" panose="020B0604020202020204" pitchFamily="34" charset="0"/>
+                      </a:endParaRPr>
+                    </a:p>
+                  </a:txBody>
+                  <a:tcPr marL="68580" marR="68580" marT="0" marB="0"/>
+                </a:tc>
+                <a:tc>
+                  <a:txBody>
+                    <a:bodyPr/>
+                    <a:lstStyle/>
+                    <a:p>
+                      <a:pPr algn="just">
+                        <a:lnSpc>
+                          <a:spcPct val="150000"/>
+                        </a:lnSpc>
+                        <a:spcAft>
+                          <a:spcPts val="0"/>
+                        </a:spcAft>
+                      </a:pPr>
+                      <a:r>
+                        <a:rPr lang="en-PH" sz="2400">
+                          <a:effectLst/>
+                          <a:latin typeface="Arial" panose="020B0604020202020204" pitchFamily="34" charset="0"/>
+                          <a:cs typeface="Arial" panose="020B0604020202020204" pitchFamily="34" charset="0"/>
+                        </a:rPr>
+                        <a:t>Unemployed</a:t>
+                      </a:r>
+                      <a:endParaRPr lang="en-PH" sz="2000" b="0">
+                        <a:effectLst/>
+                        <a:latin typeface="Arial" panose="020B0604020202020204" pitchFamily="34" charset="0"/>
+                        <a:ea typeface="Calibri" panose="020F0502020204030204" pitchFamily="34" charset="0"/>
+                        <a:cs typeface="Arial" panose="020B0604020202020204" pitchFamily="34" charset="0"/>
+                      </a:endParaRPr>
+                    </a:p>
+                  </a:txBody>
+                  <a:tcPr marL="68580" marR="68580" marT="0" marB="0"/>
+                </a:tc>
+                <a:tc>
+                  <a:txBody>
+                    <a:bodyPr/>
+                    <a:lstStyle/>
+                    <a:p>
+                      <a:pPr algn="just">
+                        <a:lnSpc>
+                          <a:spcPct val="150000"/>
+                        </a:lnSpc>
+                        <a:spcAft>
+                          <a:spcPts val="0"/>
+                        </a:spcAft>
+                      </a:pPr>
+                      <a:r>
+                        <a:rPr lang="en-PH" sz="2400">
+                          <a:effectLst/>
+                          <a:latin typeface="Arial" panose="020B0604020202020204" pitchFamily="34" charset="0"/>
+                          <a:cs typeface="Arial" panose="020B0604020202020204" pitchFamily="34" charset="0"/>
+                        </a:rPr>
+                        <a:t>-</a:t>
+                      </a:r>
+                      <a:endParaRPr lang="en-PH" sz="2000" b="0">
+                        <a:effectLst/>
+                        <a:latin typeface="Arial" panose="020B0604020202020204" pitchFamily="34" charset="0"/>
+                        <a:ea typeface="Calibri" panose="020F0502020204030204" pitchFamily="34" charset="0"/>
+                        <a:cs typeface="Arial" panose="020B0604020202020204" pitchFamily="34" charset="0"/>
+                      </a:endParaRPr>
+                    </a:p>
+                  </a:txBody>
+                  <a:tcPr marL="68580" marR="68580" marT="0" marB="0"/>
+                </a:tc>
+                <a:extLst>
+                  <a:ext uri="{0D108BD9-81ED-4DB2-BD59-A6C34878D82A}">
+                    <a16:rowId xmlns:a16="http://schemas.microsoft.com/office/drawing/2014/main" val="3015016644"/>
+                  </a:ext>
+                </a:extLst>
+              </a:tr>
+              <a:tr h="503183">
+                <a:tc>
+                  <a:txBody>
+                    <a:bodyPr/>
+                    <a:lstStyle/>
+                    <a:p>
+                      <a:pPr algn="just">
+                        <a:lnSpc>
+                          <a:spcPct val="150000"/>
+                        </a:lnSpc>
+                        <a:spcAft>
+                          <a:spcPts val="0"/>
+                        </a:spcAft>
+                      </a:pPr>
+                      <a:r>
+                        <a:rPr lang="en-PH" sz="2400">
+                          <a:effectLst/>
+                          <a:latin typeface="Arial" panose="020B0604020202020204" pitchFamily="34" charset="0"/>
+                          <a:cs typeface="Arial" panose="020B0604020202020204" pitchFamily="34" charset="0"/>
+                        </a:rPr>
+                        <a:t>Daughter B</a:t>
+                      </a:r>
+                      <a:endParaRPr lang="en-PH" sz="2000" b="0">
+                        <a:effectLst/>
+                        <a:latin typeface="Arial" panose="020B0604020202020204" pitchFamily="34" charset="0"/>
+                        <a:ea typeface="Calibri" panose="020F0502020204030204" pitchFamily="34" charset="0"/>
+                        <a:cs typeface="Arial" panose="020B0604020202020204" pitchFamily="34" charset="0"/>
+                      </a:endParaRPr>
+                    </a:p>
+                  </a:txBody>
+                  <a:tcPr marL="68580" marR="68580" marT="0" marB="0"/>
+                </a:tc>
+                <a:tc>
+                  <a:txBody>
+                    <a:bodyPr/>
+                    <a:lstStyle/>
+                    <a:p>
+                      <a:pPr algn="just">
+                        <a:lnSpc>
+                          <a:spcPct val="150000"/>
+                        </a:lnSpc>
+                        <a:spcAft>
+                          <a:spcPts val="0"/>
+                        </a:spcAft>
+                      </a:pPr>
+                      <a:r>
+                        <a:rPr lang="en-PH" sz="2400">
+                          <a:effectLst/>
+                          <a:latin typeface="Arial" panose="020B0604020202020204" pitchFamily="34" charset="0"/>
+                          <a:cs typeface="Arial" panose="020B0604020202020204" pitchFamily="34" charset="0"/>
+                        </a:rPr>
+                        <a:t>Student</a:t>
+                      </a:r>
+                      <a:endParaRPr lang="en-PH" sz="2000" b="0">
+                        <a:effectLst/>
+                        <a:latin typeface="Arial" panose="020B0604020202020204" pitchFamily="34" charset="0"/>
+                        <a:ea typeface="Calibri" panose="020F0502020204030204" pitchFamily="34" charset="0"/>
+                        <a:cs typeface="Arial" panose="020B0604020202020204" pitchFamily="34" charset="0"/>
+                      </a:endParaRPr>
+                    </a:p>
+                  </a:txBody>
+                  <a:tcPr marL="68580" marR="68580" marT="0" marB="0"/>
+                </a:tc>
+                <a:tc>
+                  <a:txBody>
+                    <a:bodyPr/>
+                    <a:lstStyle/>
+                    <a:p>
+                      <a:pPr algn="just">
+                        <a:lnSpc>
+                          <a:spcPct val="150000"/>
+                        </a:lnSpc>
+                        <a:spcAft>
+                          <a:spcPts val="0"/>
+                        </a:spcAft>
+                      </a:pPr>
+                      <a:r>
+                        <a:rPr lang="en-PH" sz="2400">
+                          <a:effectLst/>
+                          <a:latin typeface="Arial" panose="020B0604020202020204" pitchFamily="34" charset="0"/>
+                          <a:cs typeface="Arial" panose="020B0604020202020204" pitchFamily="34" charset="0"/>
+                        </a:rPr>
+                        <a:t>-</a:t>
+                      </a:r>
+                      <a:endParaRPr lang="en-PH" sz="2000" b="0">
+                        <a:effectLst/>
+                        <a:latin typeface="Arial" panose="020B0604020202020204" pitchFamily="34" charset="0"/>
+                        <a:ea typeface="Calibri" panose="020F0502020204030204" pitchFamily="34" charset="0"/>
+                        <a:cs typeface="Arial" panose="020B0604020202020204" pitchFamily="34" charset="0"/>
+                      </a:endParaRPr>
+                    </a:p>
+                  </a:txBody>
+                  <a:tcPr marL="68580" marR="68580" marT="0" marB="0"/>
+                </a:tc>
+                <a:extLst>
+                  <a:ext uri="{0D108BD9-81ED-4DB2-BD59-A6C34878D82A}">
+                    <a16:rowId xmlns:a16="http://schemas.microsoft.com/office/drawing/2014/main" val="3966587469"/>
+                  </a:ext>
+                </a:extLst>
+              </a:tr>
+              <a:tr h="503183">
+                <a:tc>
+                  <a:txBody>
+                    <a:bodyPr/>
+                    <a:lstStyle/>
+                    <a:p>
+                      <a:pPr algn="just">
+                        <a:lnSpc>
+                          <a:spcPct val="150000"/>
+                        </a:lnSpc>
+                        <a:spcAft>
+                          <a:spcPts val="0"/>
+                        </a:spcAft>
+                      </a:pPr>
+                      <a:r>
+                        <a:rPr lang="en-PH" sz="2400" dirty="0">
+                          <a:effectLst/>
+                          <a:latin typeface="Arial" panose="020B0604020202020204" pitchFamily="34" charset="0"/>
+                          <a:cs typeface="Arial" panose="020B0604020202020204" pitchFamily="34" charset="0"/>
+                        </a:rPr>
+                        <a:t>Grandmother</a:t>
+                      </a:r>
+                      <a:endParaRPr lang="en-PH" sz="2000" b="0" dirty="0">
+                        <a:effectLst/>
+                        <a:latin typeface="Arial" panose="020B0604020202020204" pitchFamily="34" charset="0"/>
+                        <a:ea typeface="Calibri" panose="020F0502020204030204" pitchFamily="34" charset="0"/>
+                        <a:cs typeface="Arial" panose="020B0604020202020204" pitchFamily="34" charset="0"/>
+                      </a:endParaRPr>
+                    </a:p>
+                  </a:txBody>
+                  <a:tcPr marL="68580" marR="68580" marT="0" marB="0"/>
+                </a:tc>
+                <a:tc>
+                  <a:txBody>
+                    <a:bodyPr/>
+                    <a:lstStyle/>
+                    <a:p>
+                      <a:pPr algn="just">
+                        <a:lnSpc>
+                          <a:spcPct val="150000"/>
+                        </a:lnSpc>
+                        <a:spcAft>
+                          <a:spcPts val="0"/>
+                        </a:spcAft>
+                      </a:pPr>
+                      <a:r>
+                        <a:rPr lang="en-PH" sz="2400">
+                          <a:effectLst/>
+                          <a:latin typeface="Arial" panose="020B0604020202020204" pitchFamily="34" charset="0"/>
+                          <a:cs typeface="Arial" panose="020B0604020202020204" pitchFamily="34" charset="0"/>
+                        </a:rPr>
+                        <a:t>Unemployed</a:t>
+                      </a:r>
+                      <a:endParaRPr lang="en-PH" sz="2000" b="0">
+                        <a:effectLst/>
+                        <a:latin typeface="Arial" panose="020B0604020202020204" pitchFamily="34" charset="0"/>
+                        <a:ea typeface="Calibri" panose="020F0502020204030204" pitchFamily="34" charset="0"/>
+                        <a:cs typeface="Arial" panose="020B0604020202020204" pitchFamily="34" charset="0"/>
+                      </a:endParaRPr>
+                    </a:p>
+                  </a:txBody>
+                  <a:tcPr marL="68580" marR="68580" marT="0" marB="0"/>
+                </a:tc>
+                <a:tc>
+                  <a:txBody>
+                    <a:bodyPr/>
+                    <a:lstStyle/>
+                    <a:p>
+                      <a:pPr algn="just">
+                        <a:lnSpc>
+                          <a:spcPct val="150000"/>
+                        </a:lnSpc>
+                        <a:spcAft>
+                          <a:spcPts val="0"/>
+                        </a:spcAft>
+                      </a:pPr>
+                      <a:r>
+                        <a:rPr lang="en-PH" sz="2400" dirty="0">
+                          <a:effectLst/>
+                          <a:latin typeface="Arial" panose="020B0604020202020204" pitchFamily="34" charset="0"/>
+                          <a:cs typeface="Arial" panose="020B0604020202020204" pitchFamily="34" charset="0"/>
+                        </a:rPr>
+                        <a:t>-</a:t>
+                      </a:r>
+                      <a:endParaRPr lang="en-PH" sz="2000" b="0" dirty="0">
+                        <a:effectLst/>
+                        <a:latin typeface="Arial" panose="020B0604020202020204" pitchFamily="34" charset="0"/>
+                        <a:ea typeface="Calibri" panose="020F0502020204030204" pitchFamily="34" charset="0"/>
+                        <a:cs typeface="Arial" panose="020B0604020202020204" pitchFamily="34" charset="0"/>
+                      </a:endParaRPr>
+                    </a:p>
+                  </a:txBody>
+                  <a:tcPr marL="68580" marR="68580" marT="0" marB="0"/>
+                </a:tc>
+                <a:extLst>
+                  <a:ext uri="{0D108BD9-81ED-4DB2-BD59-A6C34878D82A}">
+                    <a16:rowId xmlns:a16="http://schemas.microsoft.com/office/drawing/2014/main" val="206096333"/>
+                  </a:ext>
+                </a:extLst>
+              </a:tr>
+              <a:tr h="586292">
+                <a:tc gridSpan="2">
+                  <a:txBody>
+                    <a:bodyPr/>
+                    <a:lstStyle/>
+                    <a:p>
+                      <a:pPr algn="r">
+                        <a:lnSpc>
+                          <a:spcPct val="150000"/>
+                        </a:lnSpc>
+                        <a:spcAft>
+                          <a:spcPts val="0"/>
+                        </a:spcAft>
+                      </a:pPr>
+                      <a:r>
+                        <a:rPr lang="en-PH" sz="2400" dirty="0">
+                          <a:effectLst/>
+                          <a:latin typeface="Arial" panose="020B0604020202020204" pitchFamily="34" charset="0"/>
+                          <a:cs typeface="Arial" panose="020B0604020202020204" pitchFamily="34" charset="0"/>
+                        </a:rPr>
+                        <a:t>TOTAL ANNUAL FAMILY INCOME:</a:t>
+                      </a:r>
+                      <a:endParaRPr lang="en-PH" sz="2000" b="0" dirty="0">
+                        <a:effectLst/>
+                        <a:latin typeface="Arial" panose="020B0604020202020204" pitchFamily="34" charset="0"/>
+                        <a:ea typeface="Calibri" panose="020F0502020204030204" pitchFamily="34" charset="0"/>
+                        <a:cs typeface="Arial" panose="020B0604020202020204" pitchFamily="34" charset="0"/>
+                      </a:endParaRPr>
+                    </a:p>
+                  </a:txBody>
+                  <a:tcPr marL="68580" marR="68580" marT="0" marB="0"/>
+                </a:tc>
+                <a:tc hMerge="1">
+                  <a:txBody>
+                    <a:bodyPr/>
+                    <a:lstStyle/>
+                    <a:p>
+                      <a:endParaRPr lang="en-PH"/>
+                    </a:p>
+                  </a:txBody>
+                  <a:tcPr/>
+                </a:tc>
+                <a:tc>
+                  <a:txBody>
+                    <a:bodyPr/>
+                    <a:lstStyle/>
+                    <a:p>
+                      <a:pPr algn="just">
+                        <a:lnSpc>
+                          <a:spcPct val="150000"/>
+                        </a:lnSpc>
+                        <a:spcAft>
+                          <a:spcPts val="0"/>
+                        </a:spcAft>
+                      </a:pPr>
+                      <a:r>
+                        <a:rPr lang="en-PH" sz="3200" dirty="0">
+                          <a:effectLst/>
+                          <a:latin typeface="Arial" panose="020B0604020202020204" pitchFamily="34" charset="0"/>
+                          <a:cs typeface="Arial" panose="020B0604020202020204" pitchFamily="34" charset="0"/>
+                        </a:rPr>
+                        <a:t>₱  69, 000.00</a:t>
+                      </a:r>
+                      <a:endParaRPr lang="en-PH" sz="2800" b="1" dirty="0">
+                        <a:solidFill>
+                          <a:schemeClr val="accent1"/>
+                        </a:solidFill>
+                        <a:effectLst/>
+                        <a:latin typeface="Arial" panose="020B0604020202020204" pitchFamily="34" charset="0"/>
+                        <a:ea typeface="Calibri" panose="020F0502020204030204" pitchFamily="34" charset="0"/>
+                        <a:cs typeface="Arial" panose="020B0604020202020204" pitchFamily="34" charset="0"/>
+                      </a:endParaRPr>
+                    </a:p>
+                  </a:txBody>
+                  <a:tcPr marL="68580" marR="68580" marT="0" marB="0"/>
+                </a:tc>
+                <a:extLst>
+                  <a:ext uri="{0D108BD9-81ED-4DB2-BD59-A6C34878D82A}">
+                    <a16:rowId xmlns:a16="http://schemas.microsoft.com/office/drawing/2014/main" val="348264785"/>
+                  </a:ext>
+                </a:extLst>
+              </a:tr>
+            </a:tbl>
+          </a:graphicData>
+        </a:graphic>
+      </p:graphicFrame>
     </p:spTree>
     <p:extLst>
       <p:ext uri="{BB962C8B-B14F-4D97-AF65-F5344CB8AC3E}">
-        <p14:creationId xmlns:p14="http://schemas.microsoft.com/office/powerpoint/2010/main" val="214479819"/>
+        <p14:creationId xmlns:p14="http://schemas.microsoft.com/office/powerpoint/2010/main" val="3462988819"/>
       </p:ext>
     </p:extLst>
   </p:cSld>

</xml_diff>